<commit_message>
"Improvement Ideas" Folie hinzugefügt.
</commit_message>
<xml_diff>
--- a/Abgabe_04/Snake.pptx
+++ b/Abgabe_04/Snake.pptx
@@ -13,6 +13,7 @@
     <p:sldId id="263" r:id="rId7"/>
     <p:sldId id="260" r:id="rId8"/>
     <p:sldId id="264" r:id="rId9"/>
+    <p:sldId id="265" r:id="rId10"/>
   </p:sldIdLst>
   <p:sldSz cx="9144000" cy="6858000" type="screen4x3"/>
   <p:notesSz cx="6858000" cy="9144000"/>
@@ -113,7 +114,7 @@
   </p:defaultTextStyle>
   <p:extLst>
     <p:ext uri="{EFAFB233-063F-42B5-8137-9DF3F51BA10A}">
-      <p15:sldGuideLst xmlns:p15="http://schemas.microsoft.com/office/powerpoint/2012/main"/>
+      <p15:sldGuideLst xmlns:p15="http://schemas.microsoft.com/office/powerpoint/2012/main" xmlns=""/>
     </p:ext>
   </p:extLst>
 </p:presentation>
@@ -254,7 +255,8 @@
           <a:p>
             <a:fld id="{FA303DC4-2D3B-4E31-B8AD-3D70C219D792}" type="datetimeFigureOut">
               <a:rPr lang="de-DE" smtClean="0"/>
-              <a:t>19.11.2017</a:t>
+              <a:pPr/>
+              <a:t>20.11.2017</a:t>
             </a:fld>
             <a:endParaRPr lang="de-DE" dirty="0"/>
           </a:p>
@@ -296,6 +298,7 @@
           <a:p>
             <a:fld id="{28CE90B5-96F5-4A88-8E70-659052B7C6C8}" type="slidenum">
               <a:rPr lang="de-DE" smtClean="0"/>
+              <a:pPr/>
               <a:t>‹Nr.›</a:t>
             </a:fld>
             <a:endParaRPr lang="de-DE" dirty="0"/>
@@ -305,7 +308,7 @@
     </p:spTree>
     <p:extLst>
       <p:ext uri="{BB962C8B-B14F-4D97-AF65-F5344CB8AC3E}">
-        <p14:creationId xmlns:p14="http://schemas.microsoft.com/office/powerpoint/2010/main" val="3906747047"/>
+        <p14:creationId xmlns:p14="http://schemas.microsoft.com/office/powerpoint/2010/main" xmlns="" val="3906747047"/>
       </p:ext>
     </p:extLst>
   </p:cSld>
@@ -424,7 +427,8 @@
           <a:p>
             <a:fld id="{FA303DC4-2D3B-4E31-B8AD-3D70C219D792}" type="datetimeFigureOut">
               <a:rPr lang="de-DE" smtClean="0"/>
-              <a:t>19.11.2017</a:t>
+              <a:pPr/>
+              <a:t>20.11.2017</a:t>
             </a:fld>
             <a:endParaRPr lang="de-DE" dirty="0"/>
           </a:p>
@@ -466,6 +470,7 @@
           <a:p>
             <a:fld id="{28CE90B5-96F5-4A88-8E70-659052B7C6C8}" type="slidenum">
               <a:rPr lang="de-DE" smtClean="0"/>
+              <a:pPr/>
               <a:t>‹Nr.›</a:t>
             </a:fld>
             <a:endParaRPr lang="de-DE" dirty="0"/>
@@ -475,7 +480,7 @@
     </p:spTree>
     <p:extLst>
       <p:ext uri="{BB962C8B-B14F-4D97-AF65-F5344CB8AC3E}">
-        <p14:creationId xmlns:p14="http://schemas.microsoft.com/office/powerpoint/2010/main" val="2892673225"/>
+        <p14:creationId xmlns:p14="http://schemas.microsoft.com/office/powerpoint/2010/main" xmlns="" val="2892673225"/>
       </p:ext>
     </p:extLst>
   </p:cSld>
@@ -604,7 +609,8 @@
           <a:p>
             <a:fld id="{FA303DC4-2D3B-4E31-B8AD-3D70C219D792}" type="datetimeFigureOut">
               <a:rPr lang="de-DE" smtClean="0"/>
-              <a:t>19.11.2017</a:t>
+              <a:pPr/>
+              <a:t>20.11.2017</a:t>
             </a:fld>
             <a:endParaRPr lang="de-DE" dirty="0"/>
           </a:p>
@@ -646,6 +652,7 @@
           <a:p>
             <a:fld id="{28CE90B5-96F5-4A88-8E70-659052B7C6C8}" type="slidenum">
               <a:rPr lang="de-DE" smtClean="0"/>
+              <a:pPr/>
               <a:t>‹Nr.›</a:t>
             </a:fld>
             <a:endParaRPr lang="de-DE" dirty="0"/>
@@ -655,7 +662,7 @@
     </p:spTree>
     <p:extLst>
       <p:ext uri="{BB962C8B-B14F-4D97-AF65-F5344CB8AC3E}">
-        <p14:creationId xmlns:p14="http://schemas.microsoft.com/office/powerpoint/2010/main" val="2060587485"/>
+        <p14:creationId xmlns:p14="http://schemas.microsoft.com/office/powerpoint/2010/main" xmlns="" val="2060587485"/>
       </p:ext>
     </p:extLst>
   </p:cSld>
@@ -774,7 +781,8 @@
           <a:p>
             <a:fld id="{FA303DC4-2D3B-4E31-B8AD-3D70C219D792}" type="datetimeFigureOut">
               <a:rPr lang="de-DE" smtClean="0"/>
-              <a:t>19.11.2017</a:t>
+              <a:pPr/>
+              <a:t>20.11.2017</a:t>
             </a:fld>
             <a:endParaRPr lang="de-DE" dirty="0"/>
           </a:p>
@@ -816,6 +824,7 @@
           <a:p>
             <a:fld id="{28CE90B5-96F5-4A88-8E70-659052B7C6C8}" type="slidenum">
               <a:rPr lang="de-DE" smtClean="0"/>
+              <a:pPr/>
               <a:t>‹Nr.›</a:t>
             </a:fld>
             <a:endParaRPr lang="de-DE" dirty="0"/>
@@ -825,7 +834,7 @@
     </p:spTree>
     <p:extLst>
       <p:ext uri="{BB962C8B-B14F-4D97-AF65-F5344CB8AC3E}">
-        <p14:creationId xmlns:p14="http://schemas.microsoft.com/office/powerpoint/2010/main" val="1183758719"/>
+        <p14:creationId xmlns:p14="http://schemas.microsoft.com/office/powerpoint/2010/main" xmlns="" val="1183758719"/>
       </p:ext>
     </p:extLst>
   </p:cSld>
@@ -1018,7 +1027,8 @@
           <a:p>
             <a:fld id="{FA303DC4-2D3B-4E31-B8AD-3D70C219D792}" type="datetimeFigureOut">
               <a:rPr lang="de-DE" smtClean="0"/>
-              <a:t>19.11.2017</a:t>
+              <a:pPr/>
+              <a:t>20.11.2017</a:t>
             </a:fld>
             <a:endParaRPr lang="de-DE" dirty="0"/>
           </a:p>
@@ -1060,6 +1070,7 @@
           <a:p>
             <a:fld id="{28CE90B5-96F5-4A88-8E70-659052B7C6C8}" type="slidenum">
               <a:rPr lang="de-DE" smtClean="0"/>
+              <a:pPr/>
               <a:t>‹Nr.›</a:t>
             </a:fld>
             <a:endParaRPr lang="de-DE" dirty="0"/>
@@ -1069,7 +1080,7 @@
     </p:spTree>
     <p:extLst>
       <p:ext uri="{BB962C8B-B14F-4D97-AF65-F5344CB8AC3E}">
-        <p14:creationId xmlns:p14="http://schemas.microsoft.com/office/powerpoint/2010/main" val="1222447334"/>
+        <p14:creationId xmlns:p14="http://schemas.microsoft.com/office/powerpoint/2010/main" xmlns="" val="1222447334"/>
       </p:ext>
     </p:extLst>
   </p:cSld>
@@ -1250,7 +1261,8 @@
           <a:p>
             <a:fld id="{FA303DC4-2D3B-4E31-B8AD-3D70C219D792}" type="datetimeFigureOut">
               <a:rPr lang="de-DE" smtClean="0"/>
-              <a:t>19.11.2017</a:t>
+              <a:pPr/>
+              <a:t>20.11.2017</a:t>
             </a:fld>
             <a:endParaRPr lang="de-DE" dirty="0"/>
           </a:p>
@@ -1292,6 +1304,7 @@
           <a:p>
             <a:fld id="{28CE90B5-96F5-4A88-8E70-659052B7C6C8}" type="slidenum">
               <a:rPr lang="de-DE" smtClean="0"/>
+              <a:pPr/>
               <a:t>‹Nr.›</a:t>
             </a:fld>
             <a:endParaRPr lang="de-DE" dirty="0"/>
@@ -1301,7 +1314,7 @@
     </p:spTree>
     <p:extLst>
       <p:ext uri="{BB962C8B-B14F-4D97-AF65-F5344CB8AC3E}">
-        <p14:creationId xmlns:p14="http://schemas.microsoft.com/office/powerpoint/2010/main" val="2892910547"/>
+        <p14:creationId xmlns:p14="http://schemas.microsoft.com/office/powerpoint/2010/main" xmlns="" val="2892910547"/>
       </p:ext>
     </p:extLst>
   </p:cSld>
@@ -1617,7 +1630,8 @@
           <a:p>
             <a:fld id="{FA303DC4-2D3B-4E31-B8AD-3D70C219D792}" type="datetimeFigureOut">
               <a:rPr lang="de-DE" smtClean="0"/>
-              <a:t>19.11.2017</a:t>
+              <a:pPr/>
+              <a:t>20.11.2017</a:t>
             </a:fld>
             <a:endParaRPr lang="de-DE" dirty="0"/>
           </a:p>
@@ -1659,6 +1673,7 @@
           <a:p>
             <a:fld id="{28CE90B5-96F5-4A88-8E70-659052B7C6C8}" type="slidenum">
               <a:rPr lang="de-DE" smtClean="0"/>
+              <a:pPr/>
               <a:t>‹Nr.›</a:t>
             </a:fld>
             <a:endParaRPr lang="de-DE" dirty="0"/>
@@ -1668,7 +1683,7 @@
     </p:spTree>
     <p:extLst>
       <p:ext uri="{BB962C8B-B14F-4D97-AF65-F5344CB8AC3E}">
-        <p14:creationId xmlns:p14="http://schemas.microsoft.com/office/powerpoint/2010/main" val="336821960"/>
+        <p14:creationId xmlns:p14="http://schemas.microsoft.com/office/powerpoint/2010/main" xmlns="" val="336821960"/>
       </p:ext>
     </p:extLst>
   </p:cSld>
@@ -1735,7 +1750,8 @@
           <a:p>
             <a:fld id="{FA303DC4-2D3B-4E31-B8AD-3D70C219D792}" type="datetimeFigureOut">
               <a:rPr lang="de-DE" smtClean="0"/>
-              <a:t>19.11.2017</a:t>
+              <a:pPr/>
+              <a:t>20.11.2017</a:t>
             </a:fld>
             <a:endParaRPr lang="de-DE" dirty="0"/>
           </a:p>
@@ -1777,6 +1793,7 @@
           <a:p>
             <a:fld id="{28CE90B5-96F5-4A88-8E70-659052B7C6C8}" type="slidenum">
               <a:rPr lang="de-DE" smtClean="0"/>
+              <a:pPr/>
               <a:t>‹Nr.›</a:t>
             </a:fld>
             <a:endParaRPr lang="de-DE" dirty="0"/>
@@ -1786,7 +1803,7 @@
     </p:spTree>
     <p:extLst>
       <p:ext uri="{BB962C8B-B14F-4D97-AF65-F5344CB8AC3E}">
-        <p14:creationId xmlns:p14="http://schemas.microsoft.com/office/powerpoint/2010/main" val="2086666829"/>
+        <p14:creationId xmlns:p14="http://schemas.microsoft.com/office/powerpoint/2010/main" xmlns="" val="2086666829"/>
       </p:ext>
     </p:extLst>
   </p:cSld>
@@ -1830,7 +1847,8 @@
           <a:p>
             <a:fld id="{FA303DC4-2D3B-4E31-B8AD-3D70C219D792}" type="datetimeFigureOut">
               <a:rPr lang="de-DE" smtClean="0"/>
-              <a:t>19.11.2017</a:t>
+              <a:pPr/>
+              <a:t>20.11.2017</a:t>
             </a:fld>
             <a:endParaRPr lang="de-DE" dirty="0"/>
           </a:p>
@@ -1872,6 +1890,7 @@
           <a:p>
             <a:fld id="{28CE90B5-96F5-4A88-8E70-659052B7C6C8}" type="slidenum">
               <a:rPr lang="de-DE" smtClean="0"/>
+              <a:pPr/>
               <a:t>‹Nr.›</a:t>
             </a:fld>
             <a:endParaRPr lang="de-DE" dirty="0"/>
@@ -1881,7 +1900,7 @@
     </p:spTree>
     <p:extLst>
       <p:ext uri="{BB962C8B-B14F-4D97-AF65-F5344CB8AC3E}">
-        <p14:creationId xmlns:p14="http://schemas.microsoft.com/office/powerpoint/2010/main" val="3906239143"/>
+        <p14:creationId xmlns:p14="http://schemas.microsoft.com/office/powerpoint/2010/main" xmlns="" val="3906239143"/>
       </p:ext>
     </p:extLst>
   </p:cSld>
@@ -2107,7 +2126,8 @@
           <a:p>
             <a:fld id="{FA303DC4-2D3B-4E31-B8AD-3D70C219D792}" type="datetimeFigureOut">
               <a:rPr lang="de-DE" smtClean="0"/>
-              <a:t>19.11.2017</a:t>
+              <a:pPr/>
+              <a:t>20.11.2017</a:t>
             </a:fld>
             <a:endParaRPr lang="de-DE" dirty="0"/>
           </a:p>
@@ -2149,6 +2169,7 @@
           <a:p>
             <a:fld id="{28CE90B5-96F5-4A88-8E70-659052B7C6C8}" type="slidenum">
               <a:rPr lang="de-DE" smtClean="0"/>
+              <a:pPr/>
               <a:t>‹Nr.›</a:t>
             </a:fld>
             <a:endParaRPr lang="de-DE" dirty="0"/>
@@ -2158,7 +2179,7 @@
     </p:spTree>
     <p:extLst>
       <p:ext uri="{BB962C8B-B14F-4D97-AF65-F5344CB8AC3E}">
-        <p14:creationId xmlns:p14="http://schemas.microsoft.com/office/powerpoint/2010/main" val="547768235"/>
+        <p14:creationId xmlns:p14="http://schemas.microsoft.com/office/powerpoint/2010/main" xmlns="" val="547768235"/>
       </p:ext>
     </p:extLst>
   </p:cSld>
@@ -2364,7 +2385,8 @@
           <a:p>
             <a:fld id="{FA303DC4-2D3B-4E31-B8AD-3D70C219D792}" type="datetimeFigureOut">
               <a:rPr lang="de-DE" smtClean="0"/>
-              <a:t>19.11.2017</a:t>
+              <a:pPr/>
+              <a:t>20.11.2017</a:t>
             </a:fld>
             <a:endParaRPr lang="de-DE" dirty="0"/>
           </a:p>
@@ -2406,6 +2428,7 @@
           <a:p>
             <a:fld id="{28CE90B5-96F5-4A88-8E70-659052B7C6C8}" type="slidenum">
               <a:rPr lang="de-DE" smtClean="0"/>
+              <a:pPr/>
               <a:t>‹Nr.›</a:t>
             </a:fld>
             <a:endParaRPr lang="de-DE" dirty="0"/>
@@ -2415,7 +2438,7 @@
     </p:spTree>
     <p:extLst>
       <p:ext uri="{BB962C8B-B14F-4D97-AF65-F5344CB8AC3E}">
-        <p14:creationId xmlns:p14="http://schemas.microsoft.com/office/powerpoint/2010/main" val="1863037652"/>
+        <p14:creationId xmlns:p14="http://schemas.microsoft.com/office/powerpoint/2010/main" xmlns="" val="1863037652"/>
       </p:ext>
     </p:extLst>
   </p:cSld>
@@ -2577,7 +2600,8 @@
           <a:p>
             <a:fld id="{FA303DC4-2D3B-4E31-B8AD-3D70C219D792}" type="datetimeFigureOut">
               <a:rPr lang="de-DE" smtClean="0"/>
-              <a:t>19.11.2017</a:t>
+              <a:pPr/>
+              <a:t>20.11.2017</a:t>
             </a:fld>
             <a:endParaRPr lang="de-DE" dirty="0"/>
           </a:p>
@@ -2655,6 +2679,7 @@
           <a:p>
             <a:fld id="{28CE90B5-96F5-4A88-8E70-659052B7C6C8}" type="slidenum">
               <a:rPr lang="de-DE" smtClean="0"/>
+              <a:pPr/>
               <a:t>‹Nr.›</a:t>
             </a:fld>
             <a:endParaRPr lang="de-DE" dirty="0"/>
@@ -2664,7 +2689,7 @@
     </p:spTree>
     <p:extLst>
       <p:ext uri="{BB962C8B-B14F-4D97-AF65-F5344CB8AC3E}">
-        <p14:creationId xmlns:p14="http://schemas.microsoft.com/office/powerpoint/2010/main" val="618788052"/>
+        <p14:creationId xmlns:p14="http://schemas.microsoft.com/office/powerpoint/2010/main" xmlns="" val="618788052"/>
       </p:ext>
     </p:extLst>
   </p:cSld>
@@ -2991,7 +3016,7 @@
           <p:nvPr>
             <p:extLst>
               <p:ext uri="{386F3935-93C4-4BCD-93E2-E3B085C9AB24}">
-                <p16:designElem xmlns:p16="http://schemas.microsoft.com/office/powerpoint/2015/main" val="1"/>
+                <p16:designElem xmlns:p16="http://schemas.microsoft.com/office/powerpoint/2015/main" xmlns="" val="1"/>
               </p:ext>
             </p:extLst>
           </p:nvPr>
@@ -3018,7 +3043,7 @@
           <p:cNvPr id="23" name="Freeform 5">
             <a:extLst>
               <a:ext uri="{FF2B5EF4-FFF2-40B4-BE49-F238E27FC236}">
-                <a16:creationId xmlns:a16="http://schemas.microsoft.com/office/drawing/2014/main" id="{00372701-83B9-478A-9B29-7A50C8310B9A}"/>
+                <a16:creationId xmlns:a16="http://schemas.microsoft.com/office/drawing/2014/main" xmlns="" id="{00372701-83B9-478A-9B29-7A50C8310B9A}"/>
               </a:ext>
             </a:extLst>
           </p:cNvPr>
@@ -3028,7 +3053,7 @@
           <p:nvPr>
             <p:extLst>
               <p:ext uri="{386F3935-93C4-4BCD-93E2-E3B085C9AB24}">
-                <p16:designElem xmlns:p16="http://schemas.microsoft.com/office/powerpoint/2015/main" val="1"/>
+                <p16:designElem xmlns:p16="http://schemas.microsoft.com/office/powerpoint/2015/main" xmlns="" val="1"/>
               </p:ext>
             </p:extLst>
           </p:nvPr>
@@ -3139,7 +3164,7 @@
           <p:cNvPr id="25" name="Freeform 6">
             <a:extLst>
               <a:ext uri="{FF2B5EF4-FFF2-40B4-BE49-F238E27FC236}">
-                <a16:creationId xmlns:a16="http://schemas.microsoft.com/office/drawing/2014/main" id="{9EDA5044-3268-4753-AEE8-20199924E26D}"/>
+                <a16:creationId xmlns:a16="http://schemas.microsoft.com/office/drawing/2014/main" xmlns="" id="{9EDA5044-3268-4753-AEE8-20199924E26D}"/>
               </a:ext>
             </a:extLst>
           </p:cNvPr>
@@ -3149,7 +3174,7 @@
           <p:nvPr>
             <p:extLst>
               <p:ext uri="{386F3935-93C4-4BCD-93E2-E3B085C9AB24}">
-                <p16:designElem xmlns:p16="http://schemas.microsoft.com/office/powerpoint/2015/main" val="1"/>
+                <p16:designElem xmlns:p16="http://schemas.microsoft.com/office/powerpoint/2015/main" xmlns="" val="1"/>
               </p:ext>
             </p:extLst>
           </p:nvPr>
@@ -3244,7 +3269,7 @@
           <p:cNvPr id="27" name="Freeform 7">
             <a:extLst>
               <a:ext uri="{FF2B5EF4-FFF2-40B4-BE49-F238E27FC236}">
-                <a16:creationId xmlns:a16="http://schemas.microsoft.com/office/drawing/2014/main" id="{111A83C6-3159-48A2-95E0-D9A872D3EF41}"/>
+                <a16:creationId xmlns:a16="http://schemas.microsoft.com/office/drawing/2014/main" xmlns="" id="{111A83C6-3159-48A2-95E0-D9A872D3EF41}"/>
               </a:ext>
             </a:extLst>
           </p:cNvPr>
@@ -3254,7 +3279,7 @@
           <p:nvPr>
             <p:extLst>
               <p:ext uri="{386F3935-93C4-4BCD-93E2-E3B085C9AB24}">
-                <p16:designElem xmlns:p16="http://schemas.microsoft.com/office/powerpoint/2015/main" val="1"/>
+                <p16:designElem xmlns:p16="http://schemas.microsoft.com/office/powerpoint/2015/main" xmlns="" val="1"/>
               </p:ext>
             </p:extLst>
           </p:nvPr>
@@ -3379,7 +3404,7 @@
           <p:cNvPr id="5" name="Grafik 4">
             <a:extLst>
               <a:ext uri="{FF2B5EF4-FFF2-40B4-BE49-F238E27FC236}">
-                <a16:creationId xmlns:a16="http://schemas.microsoft.com/office/drawing/2014/main" id="{8CAA02B2-9FA3-4AA9-B6B7-696C7175F2B2}"/>
+                <a16:creationId xmlns:a16="http://schemas.microsoft.com/office/drawing/2014/main" xmlns="" id="{8CAA02B2-9FA3-4AA9-B6B7-696C7175F2B2}"/>
               </a:ext>
             </a:extLst>
           </p:cNvPr>
@@ -3389,10 +3414,10 @@
           <p:nvPr/>
         </p:nvPicPr>
         <p:blipFill>
-          <a:blip r:embed="rId2">
+          <a:blip r:embed="rId2" cstate="print">
             <a:extLst>
               <a:ext uri="{28A0092B-C50C-407E-A947-70E740481C1C}">
-                <a14:useLocalDpi xmlns:a14="http://schemas.microsoft.com/office/drawing/2010/main" val="0"/>
+                <a14:useLocalDpi xmlns:a14="http://schemas.microsoft.com/office/drawing/2010/main" xmlns="" val="0"/>
               </a:ext>
             </a:extLst>
           </a:blip>
@@ -3415,7 +3440,7 @@
           <p:cNvPr id="2" name="Titel 1">
             <a:extLst>
               <a:ext uri="{FF2B5EF4-FFF2-40B4-BE49-F238E27FC236}">
-                <a16:creationId xmlns:a16="http://schemas.microsoft.com/office/drawing/2014/main" id="{F484295F-0A4C-43CE-AB48-8BE9CAAF56E1}"/>
+                <a16:creationId xmlns:a16="http://schemas.microsoft.com/office/drawing/2014/main" xmlns="" id="{F484295F-0A4C-43CE-AB48-8BE9CAAF56E1}"/>
               </a:ext>
             </a:extLst>
           </p:cNvPr>
@@ -3456,7 +3481,7 @@
     </p:spTree>
     <p:extLst>
       <p:ext uri="{BB962C8B-B14F-4D97-AF65-F5344CB8AC3E}">
-        <p14:creationId xmlns:p14="http://schemas.microsoft.com/office/powerpoint/2010/main" val="3513230421"/>
+        <p14:creationId xmlns:p14="http://schemas.microsoft.com/office/powerpoint/2010/main" xmlns="" val="3513230421"/>
       </p:ext>
     </p:extLst>
   </p:cSld>
@@ -3488,7 +3513,7 @@
           <p:cNvPr id="2" name="Titel 1">
             <a:extLst>
               <a:ext uri="{FF2B5EF4-FFF2-40B4-BE49-F238E27FC236}">
-                <a16:creationId xmlns:a16="http://schemas.microsoft.com/office/drawing/2014/main" id="{F3C4A856-293E-4803-878E-F2C8DE582587}"/>
+                <a16:creationId xmlns:a16="http://schemas.microsoft.com/office/drawing/2014/main" xmlns="" id="{F3C4A856-293E-4803-878E-F2C8DE582587}"/>
               </a:ext>
             </a:extLst>
           </p:cNvPr>
@@ -3521,7 +3546,7 @@
           <p:cNvPr id="3" name="Inhaltsplatzhalter 2">
             <a:extLst>
               <a:ext uri="{FF2B5EF4-FFF2-40B4-BE49-F238E27FC236}">
-                <a16:creationId xmlns:a16="http://schemas.microsoft.com/office/drawing/2014/main" id="{680F217C-E4CE-4057-8D1A-D7BC4E6D818E}"/>
+                <a16:creationId xmlns:a16="http://schemas.microsoft.com/office/drawing/2014/main" xmlns="" id="{680F217C-E4CE-4057-8D1A-D7BC4E6D818E}"/>
               </a:ext>
             </a:extLst>
           </p:cNvPr>
@@ -3575,7 +3600,7 @@
           <p:cNvPr id="4" name="Rectangle 1">
             <a:extLst>
               <a:ext uri="{FF2B5EF4-FFF2-40B4-BE49-F238E27FC236}">
-                <a16:creationId xmlns:a16="http://schemas.microsoft.com/office/drawing/2014/main" id="{4FD2C3FD-55A5-49CF-A71B-E919D496E404}"/>
+                <a16:creationId xmlns:a16="http://schemas.microsoft.com/office/drawing/2014/main" xmlns="" id="{4FD2C3FD-55A5-49CF-A71B-E919D496E404}"/>
               </a:ext>
             </a:extLst>
           </p:cNvPr>
@@ -3601,7 +3626,7 @@
           <a:effectLst/>
           <a:extLst>
             <a:ext uri="{91240B29-F687-4F45-9708-019B960494DF}">
-              <a14:hiddenLine xmlns:a14="http://schemas.microsoft.com/office/drawing/2010/main" w="9525">
+              <a14:hiddenLine xmlns:a14="http://schemas.microsoft.com/office/drawing/2010/main" xmlns="" w="9525">
                 <a:solidFill>
                   <a:schemeClr val="tx1"/>
                 </a:solidFill>
@@ -3611,7 +3636,7 @@
               </a14:hiddenLine>
             </a:ext>
             <a:ext uri="{AF507438-7753-43E0-B8FC-AC1667EBCBE1}">
-              <a14:hiddenEffects xmlns:a14="http://schemas.microsoft.com/office/drawing/2010/main">
+              <a14:hiddenEffects xmlns:a14="http://schemas.microsoft.com/office/drawing/2010/main" xmlns="">
                 <a:effectLst>
                   <a:outerShdw dist="35921" dir="2700000" algn="ctr" rotWithShape="0">
                     <a:schemeClr val="bg2"/>
@@ -3953,6 +3978,20 @@
               </a:rPr>
               <a:t>over</a:t>
             </a:r>
+            <a:r>
+              <a:rPr kumimoji="0" lang="de-DE" altLang="de-DE" sz="1400" b="0" i="1" u="none" strike="noStrike" cap="none" normalizeH="0" baseline="0" dirty="0">
+                <a:ln>
+                  <a:noFill/>
+                </a:ln>
+                <a:solidFill>
+                  <a:srgbClr val="808080"/>
+                </a:solidFill>
+                <a:effectLst/>
+                <a:latin typeface="Courier New" panose="02070309020205020404" pitchFamily="49" charset="0"/>
+                <a:cs typeface="Courier New" panose="02070309020205020404" pitchFamily="49" charset="0"/>
+              </a:rPr>
+              <a:t/>
+            </a:r>
             <a:br>
               <a:rPr kumimoji="0" lang="de-DE" altLang="de-DE" sz="1400" b="0" i="1" u="none" strike="noStrike" cap="none" normalizeH="0" baseline="0" dirty="0">
                 <a:ln>
@@ -4203,6 +4242,20 @@
               </a:rPr>
               <a:t>apple</a:t>
             </a:r>
+            <a:r>
+              <a:rPr kumimoji="0" lang="de-DE" altLang="de-DE" sz="1400" b="0" i="1" u="none" strike="noStrike" cap="none" normalizeH="0" baseline="0" dirty="0">
+                <a:ln>
+                  <a:noFill/>
+                </a:ln>
+                <a:solidFill>
+                  <a:srgbClr val="808080"/>
+                </a:solidFill>
+                <a:effectLst/>
+                <a:latin typeface="Courier New" panose="02070309020205020404" pitchFamily="49" charset="0"/>
+                <a:cs typeface="Courier New" panose="02070309020205020404" pitchFamily="49" charset="0"/>
+              </a:rPr>
+              <a:t/>
+            </a:r>
             <a:br>
               <a:rPr kumimoji="0" lang="de-DE" altLang="de-DE" sz="1400" b="0" i="1" u="none" strike="noStrike" cap="none" normalizeH="0" baseline="0" dirty="0">
                 <a:ln>
@@ -4592,6 +4645,20 @@
               </a:rPr>
               <a:t>apple</a:t>
             </a:r>
+            <a:r>
+              <a:rPr kumimoji="0" lang="de-DE" altLang="de-DE" sz="1400" b="0" i="1" u="none" strike="noStrike" cap="none" normalizeH="0" baseline="0" dirty="0">
+                <a:ln>
+                  <a:noFill/>
+                </a:ln>
+                <a:solidFill>
+                  <a:srgbClr val="808080"/>
+                </a:solidFill>
+                <a:effectLst/>
+                <a:latin typeface="Courier New" panose="02070309020205020404" pitchFamily="49" charset="0"/>
+                <a:cs typeface="Courier New" panose="02070309020205020404" pitchFamily="49" charset="0"/>
+              </a:rPr>
+              <a:t/>
+            </a:r>
             <a:br>
               <a:rPr kumimoji="0" lang="de-DE" altLang="de-DE" sz="1400" b="0" i="1" u="none" strike="noStrike" cap="none" normalizeH="0" baseline="0" dirty="0">
                 <a:ln>
@@ -4870,6 +4937,20 @@
               </a:rPr>
               <a:t>apple</a:t>
             </a:r>
+            <a:r>
+              <a:rPr kumimoji="0" lang="de-DE" altLang="de-DE" sz="1400" b="0" i="1" u="none" strike="noStrike" cap="none" normalizeH="0" baseline="0" dirty="0">
+                <a:ln>
+                  <a:noFill/>
+                </a:ln>
+                <a:solidFill>
+                  <a:srgbClr val="808080"/>
+                </a:solidFill>
+                <a:effectLst/>
+                <a:latin typeface="Courier New" panose="02070309020205020404" pitchFamily="49" charset="0"/>
+                <a:cs typeface="Courier New" panose="02070309020205020404" pitchFamily="49" charset="0"/>
+              </a:rPr>
+              <a:t/>
+            </a:r>
             <a:br>
               <a:rPr kumimoji="0" lang="de-DE" altLang="de-DE" sz="1400" b="0" i="1" u="none" strike="noStrike" cap="none" normalizeH="0" baseline="0" dirty="0">
                 <a:ln>
@@ -4883,6 +4964,20 @@
                 <a:cs typeface="Courier New" panose="02070309020205020404" pitchFamily="49" charset="0"/>
               </a:rPr>
             </a:br>
+            <a:r>
+              <a:rPr kumimoji="0" lang="de-DE" altLang="de-DE" sz="1400" b="0" i="1" u="none" strike="noStrike" cap="none" normalizeH="0" baseline="0" dirty="0">
+                <a:ln>
+                  <a:noFill/>
+                </a:ln>
+                <a:solidFill>
+                  <a:srgbClr val="808080"/>
+                </a:solidFill>
+                <a:effectLst/>
+                <a:latin typeface="Courier New" panose="02070309020205020404" pitchFamily="49" charset="0"/>
+                <a:cs typeface="Courier New" panose="02070309020205020404" pitchFamily="49" charset="0"/>
+              </a:rPr>
+              <a:t/>
+            </a:r>
             <a:br>
               <a:rPr kumimoji="0" lang="de-DE" altLang="de-DE" sz="1400" b="0" i="1" u="none" strike="noStrike" cap="none" normalizeH="0" baseline="0" dirty="0">
                 <a:ln>
@@ -5873,7 +5968,7 @@
     </p:spTree>
     <p:extLst>
       <p:ext uri="{BB962C8B-B14F-4D97-AF65-F5344CB8AC3E}">
-        <p14:creationId xmlns:p14="http://schemas.microsoft.com/office/powerpoint/2010/main" val="1616801963"/>
+        <p14:creationId xmlns:p14="http://schemas.microsoft.com/office/powerpoint/2010/main" xmlns="" val="1616801963"/>
       </p:ext>
     </p:extLst>
   </p:cSld>
@@ -5905,7 +6000,7 @@
           <p:cNvPr id="2" name="Titel 1">
             <a:extLst>
               <a:ext uri="{FF2B5EF4-FFF2-40B4-BE49-F238E27FC236}">
-                <a16:creationId xmlns:a16="http://schemas.microsoft.com/office/drawing/2014/main" id="{F3C4A856-293E-4803-878E-F2C8DE582587}"/>
+                <a16:creationId xmlns:a16="http://schemas.microsoft.com/office/drawing/2014/main" xmlns="" id="{F3C4A856-293E-4803-878E-F2C8DE582587}"/>
               </a:ext>
             </a:extLst>
           </p:cNvPr>
@@ -5943,7 +6038,7 @@
           <p:cNvPr id="7" name="Grafik 6" descr="Ein Bild, das Screenshot enthält.&#10;&#10;Mit sehr hoher Zuverlässigkeit generierte Beschreibung">
             <a:extLst>
               <a:ext uri="{FF2B5EF4-FFF2-40B4-BE49-F238E27FC236}">
-                <a16:creationId xmlns:a16="http://schemas.microsoft.com/office/drawing/2014/main" id="{DA614065-02B3-4462-AAF4-17DD34F7BC18}"/>
+                <a16:creationId xmlns:a16="http://schemas.microsoft.com/office/drawing/2014/main" xmlns="" id="{DA614065-02B3-4462-AAF4-17DD34F7BC18}"/>
               </a:ext>
             </a:extLst>
           </p:cNvPr>
@@ -5953,10 +6048,10 @@
           <p:nvPr/>
         </p:nvPicPr>
         <p:blipFill>
-          <a:blip r:embed="rId2">
+          <a:blip r:embed="rId2" cstate="print">
             <a:extLst>
               <a:ext uri="{28A0092B-C50C-407E-A947-70E740481C1C}">
-                <a14:useLocalDpi xmlns:a14="http://schemas.microsoft.com/office/drawing/2010/main" val="0"/>
+                <a14:useLocalDpi xmlns:a14="http://schemas.microsoft.com/office/drawing/2010/main" xmlns="" val="0"/>
               </a:ext>
             </a:extLst>
           </a:blip>
@@ -5979,7 +6074,7 @@
           <p:cNvPr id="9" name="Grafik 8" descr="Ein Bild, das Screenshot enthält.&#10;&#10;Mit sehr hoher Zuverlässigkeit generierte Beschreibung">
             <a:extLst>
               <a:ext uri="{FF2B5EF4-FFF2-40B4-BE49-F238E27FC236}">
-                <a16:creationId xmlns:a16="http://schemas.microsoft.com/office/drawing/2014/main" id="{2BF2EBE6-EBF9-458B-882D-67E30AEED9E3}"/>
+                <a16:creationId xmlns:a16="http://schemas.microsoft.com/office/drawing/2014/main" xmlns="" id="{2BF2EBE6-EBF9-458B-882D-67E30AEED9E3}"/>
               </a:ext>
             </a:extLst>
           </p:cNvPr>
@@ -5989,10 +6084,10 @@
           <p:nvPr/>
         </p:nvPicPr>
         <p:blipFill>
-          <a:blip r:embed="rId3">
+          <a:blip r:embed="rId3" cstate="print">
             <a:extLst>
               <a:ext uri="{28A0092B-C50C-407E-A947-70E740481C1C}">
-                <a14:useLocalDpi xmlns:a14="http://schemas.microsoft.com/office/drawing/2010/main" val="0"/>
+                <a14:useLocalDpi xmlns:a14="http://schemas.microsoft.com/office/drawing/2010/main" xmlns="" val="0"/>
               </a:ext>
             </a:extLst>
           </a:blip>
@@ -6015,7 +6110,7 @@
           <p:cNvPr id="15" name="Grafik 14" descr="Ein Bild, das Screenshot enthält.&#10;&#10;Mit sehr hoher Zuverlässigkeit generierte Beschreibung">
             <a:extLst>
               <a:ext uri="{FF2B5EF4-FFF2-40B4-BE49-F238E27FC236}">
-                <a16:creationId xmlns:a16="http://schemas.microsoft.com/office/drawing/2014/main" id="{34B82BAF-3EBC-44B4-AAED-084C6A39358F}"/>
+                <a16:creationId xmlns:a16="http://schemas.microsoft.com/office/drawing/2014/main" xmlns="" id="{34B82BAF-3EBC-44B4-AAED-084C6A39358F}"/>
               </a:ext>
             </a:extLst>
           </p:cNvPr>
@@ -6025,10 +6120,10 @@
           <p:nvPr/>
         </p:nvPicPr>
         <p:blipFill>
-          <a:blip r:embed="rId4">
+          <a:blip r:embed="rId4" cstate="print">
             <a:extLst>
               <a:ext uri="{28A0092B-C50C-407E-A947-70E740481C1C}">
-                <a14:useLocalDpi xmlns:a14="http://schemas.microsoft.com/office/drawing/2010/main" val="0"/>
+                <a14:useLocalDpi xmlns:a14="http://schemas.microsoft.com/office/drawing/2010/main" xmlns="" val="0"/>
               </a:ext>
             </a:extLst>
           </a:blip>
@@ -6051,7 +6146,7 @@
           <p:cNvPr id="17" name="Grafik 16" descr="Ein Bild, das Screenshot enthält.&#10;&#10;Mit hoher Zuverlässigkeit generierte Beschreibung">
             <a:extLst>
               <a:ext uri="{FF2B5EF4-FFF2-40B4-BE49-F238E27FC236}">
-                <a16:creationId xmlns:a16="http://schemas.microsoft.com/office/drawing/2014/main" id="{D72731C5-16C6-4AD2-889F-17367D63BF66}"/>
+                <a16:creationId xmlns:a16="http://schemas.microsoft.com/office/drawing/2014/main" xmlns="" id="{D72731C5-16C6-4AD2-889F-17367D63BF66}"/>
               </a:ext>
             </a:extLst>
           </p:cNvPr>
@@ -6061,10 +6156,10 @@
           <p:nvPr/>
         </p:nvPicPr>
         <p:blipFill>
-          <a:blip r:embed="rId5">
+          <a:blip r:embed="rId5" cstate="print">
             <a:extLst>
               <a:ext uri="{28A0092B-C50C-407E-A947-70E740481C1C}">
-                <a14:useLocalDpi xmlns:a14="http://schemas.microsoft.com/office/drawing/2010/main" val="0"/>
+                <a14:useLocalDpi xmlns:a14="http://schemas.microsoft.com/office/drawing/2010/main" xmlns="" val="0"/>
               </a:ext>
             </a:extLst>
           </a:blip>
@@ -6085,7 +6180,7 @@
     </p:spTree>
     <p:extLst>
       <p:ext uri="{BB962C8B-B14F-4D97-AF65-F5344CB8AC3E}">
-        <p14:creationId xmlns:p14="http://schemas.microsoft.com/office/powerpoint/2010/main" val="2454394433"/>
+        <p14:creationId xmlns:p14="http://schemas.microsoft.com/office/powerpoint/2010/main" xmlns="" val="2454394433"/>
       </p:ext>
     </p:extLst>
   </p:cSld>
@@ -6117,7 +6212,7 @@
           <p:cNvPr id="2" name="Titel 1">
             <a:extLst>
               <a:ext uri="{FF2B5EF4-FFF2-40B4-BE49-F238E27FC236}">
-                <a16:creationId xmlns:a16="http://schemas.microsoft.com/office/drawing/2014/main" id="{F3C4A856-293E-4803-878E-F2C8DE582587}"/>
+                <a16:creationId xmlns:a16="http://schemas.microsoft.com/office/drawing/2014/main" xmlns="" id="{F3C4A856-293E-4803-878E-F2C8DE582587}"/>
               </a:ext>
             </a:extLst>
           </p:cNvPr>
@@ -6155,7 +6250,7 @@
           <p:cNvPr id="11" name="Grafik 10" descr="Ein Bild, das Screenshot enthält.&#10;&#10;Mit sehr hoher Zuverlässigkeit generierte Beschreibung">
             <a:extLst>
               <a:ext uri="{FF2B5EF4-FFF2-40B4-BE49-F238E27FC236}">
-                <a16:creationId xmlns:a16="http://schemas.microsoft.com/office/drawing/2014/main" id="{B459BF4D-D464-4073-8BEB-90A830C0535D}"/>
+                <a16:creationId xmlns:a16="http://schemas.microsoft.com/office/drawing/2014/main" xmlns="" id="{B459BF4D-D464-4073-8BEB-90A830C0535D}"/>
               </a:ext>
             </a:extLst>
           </p:cNvPr>
@@ -6165,10 +6260,10 @@
           <p:nvPr/>
         </p:nvPicPr>
         <p:blipFill>
-          <a:blip r:embed="rId2">
+          <a:blip r:embed="rId2" cstate="print">
             <a:extLst>
               <a:ext uri="{28A0092B-C50C-407E-A947-70E740481C1C}">
-                <a14:useLocalDpi xmlns:a14="http://schemas.microsoft.com/office/drawing/2010/main" val="0"/>
+                <a14:useLocalDpi xmlns:a14="http://schemas.microsoft.com/office/drawing/2010/main" xmlns="" val="0"/>
               </a:ext>
             </a:extLst>
           </a:blip>
@@ -6191,7 +6286,7 @@
           <p:cNvPr id="13" name="Grafik 12" descr="Ein Bild, das Screenshot enthält.&#10;&#10;Mit sehr hoher Zuverlässigkeit generierte Beschreibung">
             <a:extLst>
               <a:ext uri="{FF2B5EF4-FFF2-40B4-BE49-F238E27FC236}">
-                <a16:creationId xmlns:a16="http://schemas.microsoft.com/office/drawing/2014/main" id="{95574CB2-CACE-4B80-9599-BCAB69C59C00}"/>
+                <a16:creationId xmlns:a16="http://schemas.microsoft.com/office/drawing/2014/main" xmlns="" id="{95574CB2-CACE-4B80-9599-BCAB69C59C00}"/>
               </a:ext>
             </a:extLst>
           </p:cNvPr>
@@ -6201,10 +6296,10 @@
           <p:nvPr/>
         </p:nvPicPr>
         <p:blipFill>
-          <a:blip r:embed="rId3">
+          <a:blip r:embed="rId3" cstate="print">
             <a:extLst>
               <a:ext uri="{28A0092B-C50C-407E-A947-70E740481C1C}">
-                <a14:useLocalDpi xmlns:a14="http://schemas.microsoft.com/office/drawing/2010/main" val="0"/>
+                <a14:useLocalDpi xmlns:a14="http://schemas.microsoft.com/office/drawing/2010/main" xmlns="" val="0"/>
               </a:ext>
             </a:extLst>
           </a:blip>
@@ -6227,7 +6322,7 @@
           <p:cNvPr id="17" name="Grafik 16" descr="Ein Bild, das Screenshot enthält.&#10;&#10;Mit hoher Zuverlässigkeit generierte Beschreibung">
             <a:extLst>
               <a:ext uri="{FF2B5EF4-FFF2-40B4-BE49-F238E27FC236}">
-                <a16:creationId xmlns:a16="http://schemas.microsoft.com/office/drawing/2014/main" id="{D72731C5-16C6-4AD2-889F-17367D63BF66}"/>
+                <a16:creationId xmlns:a16="http://schemas.microsoft.com/office/drawing/2014/main" xmlns="" id="{D72731C5-16C6-4AD2-889F-17367D63BF66}"/>
               </a:ext>
             </a:extLst>
           </p:cNvPr>
@@ -6237,10 +6332,10 @@
           <p:nvPr/>
         </p:nvPicPr>
         <p:blipFill>
-          <a:blip r:embed="rId4">
+          <a:blip r:embed="rId4" cstate="print">
             <a:extLst>
               <a:ext uri="{28A0092B-C50C-407E-A947-70E740481C1C}">
-                <a14:useLocalDpi xmlns:a14="http://schemas.microsoft.com/office/drawing/2010/main" val="0"/>
+                <a14:useLocalDpi xmlns:a14="http://schemas.microsoft.com/office/drawing/2010/main" xmlns="" val="0"/>
               </a:ext>
             </a:extLst>
           </a:blip>
@@ -6263,7 +6358,7 @@
           <p:cNvPr id="10" name="Titel 1">
             <a:extLst>
               <a:ext uri="{FF2B5EF4-FFF2-40B4-BE49-F238E27FC236}">
-                <a16:creationId xmlns:a16="http://schemas.microsoft.com/office/drawing/2014/main" id="{F9F43983-8000-46E0-917B-5E790B5F8CCA}"/>
+                <a16:creationId xmlns:a16="http://schemas.microsoft.com/office/drawing/2014/main" xmlns="" id="{F9F43983-8000-46E0-917B-5E790B5F8CCA}"/>
               </a:ext>
             </a:extLst>
           </p:cNvPr>
@@ -6396,7 +6491,7 @@
     </p:spTree>
     <p:extLst>
       <p:ext uri="{BB962C8B-B14F-4D97-AF65-F5344CB8AC3E}">
-        <p14:creationId xmlns:p14="http://schemas.microsoft.com/office/powerpoint/2010/main" val="4090947474"/>
+        <p14:creationId xmlns:p14="http://schemas.microsoft.com/office/powerpoint/2010/main" xmlns="" val="4090947474"/>
       </p:ext>
     </p:extLst>
   </p:cSld>
@@ -6428,7 +6523,7 @@
           <p:cNvPr id="2" name="Titel 1">
             <a:extLst>
               <a:ext uri="{FF2B5EF4-FFF2-40B4-BE49-F238E27FC236}">
-                <a16:creationId xmlns:a16="http://schemas.microsoft.com/office/drawing/2014/main" id="{790F9AC3-0C0B-44A8-BABD-11158595DB04}"/>
+                <a16:creationId xmlns:a16="http://schemas.microsoft.com/office/drawing/2014/main" xmlns="" id="{790F9AC3-0C0B-44A8-BABD-11158595DB04}"/>
               </a:ext>
             </a:extLst>
           </p:cNvPr>
@@ -6456,7 +6551,7 @@
           <p:cNvPr id="5" name="Titel 1">
             <a:extLst>
               <a:ext uri="{FF2B5EF4-FFF2-40B4-BE49-F238E27FC236}">
-                <a16:creationId xmlns:a16="http://schemas.microsoft.com/office/drawing/2014/main" id="{68F06C64-4236-48EC-9335-9933BD05103B}"/>
+                <a16:creationId xmlns:a16="http://schemas.microsoft.com/office/drawing/2014/main" xmlns="" id="{68F06C64-4236-48EC-9335-9933BD05103B}"/>
               </a:ext>
             </a:extLst>
           </p:cNvPr>
@@ -6656,19 +6751,16 @@
               <a:t>Show </a:t>
             </a:r>
             <a:r>
-              <a:rPr lang="en-US" altLang="de-DE" sz="2800" dirty="0" err="1">
+              <a:rPr lang="en-US" altLang="de-DE" sz="2800" dirty="0" smtClean="0">
                 <a:latin typeface="+mn-lt"/>
                 <a:cs typeface="Courier New" panose="02070309020205020404" pitchFamily="49" charset="0"/>
               </a:rPr>
-              <a:t>histogramm</a:t>
-            </a:r>
-            <a:r>
-              <a:rPr lang="en-US" altLang="de-DE" sz="2800" dirty="0">
-                <a:latin typeface="+mn-lt"/>
-                <a:cs typeface="Courier New" panose="02070309020205020404" pitchFamily="49" charset="0"/>
-              </a:rPr>
-              <a:t> </a:t>
-            </a:r>
+              <a:t>histogram </a:t>
+            </a:r>
+            <a:endParaRPr lang="en-US" altLang="de-DE" sz="2800" dirty="0">
+              <a:latin typeface="+mn-lt"/>
+              <a:cs typeface="Courier New" panose="02070309020205020404" pitchFamily="49" charset="0"/>
+            </a:endParaRPr>
           </a:p>
           <a:p>
             <a:pPr marL="514350" indent="-514350">
@@ -6712,7 +6804,7 @@
     </p:spTree>
     <p:extLst>
       <p:ext uri="{BB962C8B-B14F-4D97-AF65-F5344CB8AC3E}">
-        <p14:creationId xmlns:p14="http://schemas.microsoft.com/office/powerpoint/2010/main" val="730482725"/>
+        <p14:creationId xmlns:p14="http://schemas.microsoft.com/office/powerpoint/2010/main" xmlns="" val="730482725"/>
       </p:ext>
     </p:extLst>
   </p:cSld>
@@ -6744,7 +6836,7 @@
           <p:cNvPr id="2" name="Titel 1">
             <a:extLst>
               <a:ext uri="{FF2B5EF4-FFF2-40B4-BE49-F238E27FC236}">
-                <a16:creationId xmlns:a16="http://schemas.microsoft.com/office/drawing/2014/main" id="{AE3234C3-EE4D-4822-8FF7-55BABE181E85}"/>
+                <a16:creationId xmlns:a16="http://schemas.microsoft.com/office/drawing/2014/main" xmlns="" id="{AE3234C3-EE4D-4822-8FF7-55BABE181E85}"/>
               </a:ext>
             </a:extLst>
           </p:cNvPr>
@@ -6778,7 +6870,7 @@
           <p:cNvPr id="4" name="Grafik 3" descr="Ein Bild, das Screenshot enthält.&#10;&#10;Mit sehr hoher Zuverlässigkeit generierte Beschreibung">
             <a:extLst>
               <a:ext uri="{FF2B5EF4-FFF2-40B4-BE49-F238E27FC236}">
-                <a16:creationId xmlns:a16="http://schemas.microsoft.com/office/drawing/2014/main" id="{404D9847-5971-4F91-AFE8-B4F10838B6AD}"/>
+                <a16:creationId xmlns:a16="http://schemas.microsoft.com/office/drawing/2014/main" xmlns="" id="{404D9847-5971-4F91-AFE8-B4F10838B6AD}"/>
               </a:ext>
             </a:extLst>
           </p:cNvPr>
@@ -6788,10 +6880,10 @@
           <p:nvPr/>
         </p:nvPicPr>
         <p:blipFill>
-          <a:blip r:embed="rId2">
+          <a:blip r:embed="rId2" cstate="print">
             <a:extLst>
               <a:ext uri="{28A0092B-C50C-407E-A947-70E740481C1C}">
-                <a14:useLocalDpi xmlns:a14="http://schemas.microsoft.com/office/drawing/2010/main" val="0"/>
+                <a14:useLocalDpi xmlns:a14="http://schemas.microsoft.com/office/drawing/2010/main" xmlns="" val="0"/>
               </a:ext>
             </a:extLst>
           </a:blip>
@@ -6814,7 +6906,7 @@
           <p:cNvPr id="6" name="Grafik 5" descr="Ein Bild, das Screenshot enthält.&#10;&#10;Mit sehr hoher Zuverlässigkeit generierte Beschreibung">
             <a:extLst>
               <a:ext uri="{FF2B5EF4-FFF2-40B4-BE49-F238E27FC236}">
-                <a16:creationId xmlns:a16="http://schemas.microsoft.com/office/drawing/2014/main" id="{D9F400AE-E8D0-42A1-9E92-C3F29CD4F89A}"/>
+                <a16:creationId xmlns:a16="http://schemas.microsoft.com/office/drawing/2014/main" xmlns="" id="{D9F400AE-E8D0-42A1-9E92-C3F29CD4F89A}"/>
               </a:ext>
             </a:extLst>
           </p:cNvPr>
@@ -6824,10 +6916,10 @@
           <p:nvPr/>
         </p:nvPicPr>
         <p:blipFill>
-          <a:blip r:embed="rId3">
+          <a:blip r:embed="rId3" cstate="print">
             <a:extLst>
               <a:ext uri="{28A0092B-C50C-407E-A947-70E740481C1C}">
-                <a14:useLocalDpi xmlns:a14="http://schemas.microsoft.com/office/drawing/2010/main" val="0"/>
+                <a14:useLocalDpi xmlns:a14="http://schemas.microsoft.com/office/drawing/2010/main" xmlns="" val="0"/>
               </a:ext>
             </a:extLst>
           </a:blip>
@@ -6850,7 +6942,7 @@
           <p:cNvPr id="8" name="Grafik 7" descr="Ein Bild, das Screenshot enthält.&#10;&#10;Mit sehr hoher Zuverlässigkeit generierte Beschreibung">
             <a:extLst>
               <a:ext uri="{FF2B5EF4-FFF2-40B4-BE49-F238E27FC236}">
-                <a16:creationId xmlns:a16="http://schemas.microsoft.com/office/drawing/2014/main" id="{B93D52A2-84BA-46FA-9D4B-E1FEADF08042}"/>
+                <a16:creationId xmlns:a16="http://schemas.microsoft.com/office/drawing/2014/main" xmlns="" id="{B93D52A2-84BA-46FA-9D4B-E1FEADF08042}"/>
               </a:ext>
             </a:extLst>
           </p:cNvPr>
@@ -6860,10 +6952,10 @@
           <p:nvPr/>
         </p:nvPicPr>
         <p:blipFill>
-          <a:blip r:embed="rId4">
+          <a:blip r:embed="rId4" cstate="print">
             <a:extLst>
               <a:ext uri="{28A0092B-C50C-407E-A947-70E740481C1C}">
-                <a14:useLocalDpi xmlns:a14="http://schemas.microsoft.com/office/drawing/2010/main" val="0"/>
+                <a14:useLocalDpi xmlns:a14="http://schemas.microsoft.com/office/drawing/2010/main" xmlns="" val="0"/>
               </a:ext>
             </a:extLst>
           </a:blip>
@@ -6886,7 +6978,7 @@
           <p:cNvPr id="10" name="Grafik 9" descr="Ein Bild, das Screenshot enthält.&#10;&#10;Mit hoher Zuverlässigkeit generierte Beschreibung">
             <a:extLst>
               <a:ext uri="{FF2B5EF4-FFF2-40B4-BE49-F238E27FC236}">
-                <a16:creationId xmlns:a16="http://schemas.microsoft.com/office/drawing/2014/main" id="{77889346-267D-4CE1-A84E-CF6C081A2841}"/>
+                <a16:creationId xmlns:a16="http://schemas.microsoft.com/office/drawing/2014/main" xmlns="" id="{77889346-267D-4CE1-A84E-CF6C081A2841}"/>
               </a:ext>
             </a:extLst>
           </p:cNvPr>
@@ -6896,10 +6988,10 @@
           <p:nvPr/>
         </p:nvPicPr>
         <p:blipFill>
-          <a:blip r:embed="rId5">
+          <a:blip r:embed="rId5" cstate="print">
             <a:extLst>
               <a:ext uri="{28A0092B-C50C-407E-A947-70E740481C1C}">
-                <a14:useLocalDpi xmlns:a14="http://schemas.microsoft.com/office/drawing/2010/main" val="0"/>
+                <a14:useLocalDpi xmlns:a14="http://schemas.microsoft.com/office/drawing/2010/main" xmlns="" val="0"/>
               </a:ext>
             </a:extLst>
           </a:blip>
@@ -6922,7 +7014,7 @@
           <p:cNvPr id="11" name="Titel 1">
             <a:extLst>
               <a:ext uri="{FF2B5EF4-FFF2-40B4-BE49-F238E27FC236}">
-                <a16:creationId xmlns:a16="http://schemas.microsoft.com/office/drawing/2014/main" id="{78A0882B-D18F-457A-94C6-1863D9074DD8}"/>
+                <a16:creationId xmlns:a16="http://schemas.microsoft.com/office/drawing/2014/main" xmlns="" id="{78A0882B-D18F-457A-94C6-1863D9074DD8}"/>
               </a:ext>
             </a:extLst>
           </p:cNvPr>
@@ -6975,7 +7067,7 @@
     </p:spTree>
     <p:extLst>
       <p:ext uri="{BB962C8B-B14F-4D97-AF65-F5344CB8AC3E}">
-        <p14:creationId xmlns:p14="http://schemas.microsoft.com/office/powerpoint/2010/main" val="3084186297"/>
+        <p14:creationId xmlns:p14="http://schemas.microsoft.com/office/powerpoint/2010/main" xmlns="" val="3084186297"/>
       </p:ext>
     </p:extLst>
   </p:cSld>
@@ -7007,7 +7099,7 @@
           <p:cNvPr id="2" name="Titel 1">
             <a:extLst>
               <a:ext uri="{FF2B5EF4-FFF2-40B4-BE49-F238E27FC236}">
-                <a16:creationId xmlns:a16="http://schemas.microsoft.com/office/drawing/2014/main" id="{AE3234C3-EE4D-4822-8FF7-55BABE181E85}"/>
+                <a16:creationId xmlns:a16="http://schemas.microsoft.com/office/drawing/2014/main" xmlns="" id="{AE3234C3-EE4D-4822-8FF7-55BABE181E85}"/>
               </a:ext>
             </a:extLst>
           </p:cNvPr>
@@ -7041,7 +7133,7 @@
           <p:cNvPr id="10" name="Grafik 9" descr="Ein Bild, das Screenshot enthält.&#10;&#10;Mit hoher Zuverlässigkeit generierte Beschreibung">
             <a:extLst>
               <a:ext uri="{FF2B5EF4-FFF2-40B4-BE49-F238E27FC236}">
-                <a16:creationId xmlns:a16="http://schemas.microsoft.com/office/drawing/2014/main" id="{77889346-267D-4CE1-A84E-CF6C081A2841}"/>
+                <a16:creationId xmlns:a16="http://schemas.microsoft.com/office/drawing/2014/main" xmlns="" id="{77889346-267D-4CE1-A84E-CF6C081A2841}"/>
               </a:ext>
             </a:extLst>
           </p:cNvPr>
@@ -7051,10 +7143,10 @@
           <p:nvPr/>
         </p:nvPicPr>
         <p:blipFill>
-          <a:blip r:embed="rId2">
+          <a:blip r:embed="rId2" cstate="print">
             <a:extLst>
               <a:ext uri="{28A0092B-C50C-407E-A947-70E740481C1C}">
-                <a14:useLocalDpi xmlns:a14="http://schemas.microsoft.com/office/drawing/2010/main" val="0"/>
+                <a14:useLocalDpi xmlns:a14="http://schemas.microsoft.com/office/drawing/2010/main" xmlns="" val="0"/>
               </a:ext>
             </a:extLst>
           </a:blip>
@@ -7077,7 +7169,7 @@
           <p:cNvPr id="13" name="Grafik 12" descr="Ein Bild, das Screenshot enthält.&#10;&#10;Mit sehr hoher Zuverlässigkeit generierte Beschreibung">
             <a:extLst>
               <a:ext uri="{FF2B5EF4-FFF2-40B4-BE49-F238E27FC236}">
-                <a16:creationId xmlns:a16="http://schemas.microsoft.com/office/drawing/2014/main" id="{3A25BF2C-386F-4E5F-B9CC-06F89626B890}"/>
+                <a16:creationId xmlns:a16="http://schemas.microsoft.com/office/drawing/2014/main" xmlns="" id="{3A25BF2C-386F-4E5F-B9CC-06F89626B890}"/>
               </a:ext>
             </a:extLst>
           </p:cNvPr>
@@ -7087,10 +7179,10 @@
           <p:nvPr/>
         </p:nvPicPr>
         <p:blipFill>
-          <a:blip r:embed="rId3">
+          <a:blip r:embed="rId3" cstate="print">
             <a:extLst>
               <a:ext uri="{28A0092B-C50C-407E-A947-70E740481C1C}">
-                <a14:useLocalDpi xmlns:a14="http://schemas.microsoft.com/office/drawing/2010/main" val="0"/>
+                <a14:useLocalDpi xmlns:a14="http://schemas.microsoft.com/office/drawing/2010/main" xmlns="" val="0"/>
               </a:ext>
             </a:extLst>
           </a:blip>
@@ -7111,7 +7203,7 @@
     </p:spTree>
     <p:extLst>
       <p:ext uri="{BB962C8B-B14F-4D97-AF65-F5344CB8AC3E}">
-        <p14:creationId xmlns:p14="http://schemas.microsoft.com/office/powerpoint/2010/main" val="3112286815"/>
+        <p14:creationId xmlns:p14="http://schemas.microsoft.com/office/powerpoint/2010/main" xmlns="" val="3112286815"/>
       </p:ext>
     </p:extLst>
   </p:cSld>
@@ -7143,7 +7235,7 @@
           <p:cNvPr id="2" name="Titel 1">
             <a:extLst>
               <a:ext uri="{FF2B5EF4-FFF2-40B4-BE49-F238E27FC236}">
-                <a16:creationId xmlns:a16="http://schemas.microsoft.com/office/drawing/2014/main" id="{AE3234C3-EE4D-4822-8FF7-55BABE181E85}"/>
+                <a16:creationId xmlns:a16="http://schemas.microsoft.com/office/drawing/2014/main" xmlns="" id="{AE3234C3-EE4D-4822-8FF7-55BABE181E85}"/>
               </a:ext>
             </a:extLst>
           </p:cNvPr>
@@ -7173,7 +7265,7 @@
         </p:txBody>
       </p:sp>
       <mc:AlternateContent xmlns:mc="http://schemas.openxmlformats.org/markup-compatibility/2006">
-        <mc:Choice xmlns:a14="http://schemas.microsoft.com/office/drawing/2010/main" Requires="a14">
+        <mc:Choice xmlns:a14="http://schemas.microsoft.com/office/drawing/2010/main" xmlns="" Requires="a14">
           <p:sp>
             <p:nvSpPr>
               <p:cNvPr id="5" name="Titel 1">
@@ -7321,7 +7413,7 @@
               <p:cNvPr id="5" name="Titel 1">
                 <a:extLst>
                   <a:ext uri="{FF2B5EF4-FFF2-40B4-BE49-F238E27FC236}">
-                    <a16:creationId xmlns:a16="http://schemas.microsoft.com/office/drawing/2014/main" id="{6E7B1F94-82A4-488C-B127-0C0E509EC791}"/>
+                    <a16:creationId xmlns:a16="http://schemas.microsoft.com/office/drawing/2014/main" xmlns="" id="{6E7B1F94-82A4-488C-B127-0C0E509EC791}"/>
                   </a:ext>
                 </a:extLst>
               </p:cNvPr>
@@ -7339,7 +7431,7 @@
                 <a:avLst/>
               </a:prstGeom>
               <a:blipFill>
-                <a:blip r:embed="rId2"/>
+                <a:blip r:embed="rId2" cstate="print"/>
                 <a:stretch>
                   <a:fillRect l="-1546" t="-10644"/>
                 </a:stretch>
@@ -7363,9 +7455,98 @@
     </p:spTree>
     <p:extLst>
       <p:ext uri="{BB962C8B-B14F-4D97-AF65-F5344CB8AC3E}">
-        <p14:creationId xmlns:p14="http://schemas.microsoft.com/office/powerpoint/2010/main" val="728113264"/>
+        <p14:creationId xmlns:p14="http://schemas.microsoft.com/office/powerpoint/2010/main" xmlns="" val="728113264"/>
       </p:ext>
     </p:extLst>
+  </p:cSld>
+  <p:clrMapOvr>
+    <a:masterClrMapping/>
+  </p:clrMapOvr>
+</p:sld>
+</file>
+
+<file path=ppt/slides/slide9.xml><?xml version="1.0" encoding="utf-8"?>
+<p:sld xmlns:a="http://schemas.openxmlformats.org/drawingml/2006/main" xmlns:r="http://schemas.openxmlformats.org/officeDocument/2006/relationships" xmlns:p="http://schemas.openxmlformats.org/presentationml/2006/main">
+  <p:cSld>
+    <p:spTree>
+      <p:nvGrpSpPr>
+        <p:cNvPr id="1" name=""/>
+        <p:cNvGrpSpPr/>
+        <p:nvPr/>
+      </p:nvGrpSpPr>
+      <p:grpSpPr>
+        <a:xfrm>
+          <a:off x="0" y="0"/>
+          <a:ext cx="0" cy="0"/>
+          <a:chOff x="0" y="0"/>
+          <a:chExt cx="0" cy="0"/>
+        </a:xfrm>
+      </p:grpSpPr>
+      <p:sp>
+        <p:nvSpPr>
+          <p:cNvPr id="2" name="Titel 1"/>
+          <p:cNvSpPr>
+            <a:spLocks noGrp="1"/>
+          </p:cNvSpPr>
+          <p:nvPr>
+            <p:ph type="title"/>
+          </p:nvPr>
+        </p:nvSpPr>
+        <p:spPr/>
+        <p:txBody>
+          <a:bodyPr/>
+          <a:lstStyle/>
+          <a:p>
+            <a:r>
+              <a:rPr lang="en-GB" dirty="0" smtClean="0"/>
+              <a:t>Improvement ideas</a:t>
+            </a:r>
+            <a:endParaRPr lang="en-GB" dirty="0"/>
+          </a:p>
+        </p:txBody>
+      </p:sp>
+      <p:sp>
+        <p:nvSpPr>
+          <p:cNvPr id="3" name="Inhaltsplatzhalter 2"/>
+          <p:cNvSpPr>
+            <a:spLocks noGrp="1"/>
+          </p:cNvSpPr>
+          <p:nvPr>
+            <p:ph idx="1"/>
+          </p:nvPr>
+        </p:nvSpPr>
+        <p:spPr/>
+        <p:txBody>
+          <a:bodyPr/>
+          <a:lstStyle/>
+          <a:p>
+            <a:r>
+              <a:rPr lang="en-GB" dirty="0" smtClean="0"/>
+              <a:t>Reduce number of states</a:t>
+            </a:r>
+          </a:p>
+          <a:p>
+            <a:r>
+              <a:rPr lang="en-GB" dirty="0" smtClean="0"/>
+              <a:t>Smaller playground for the snake</a:t>
+            </a:r>
+          </a:p>
+          <a:p>
+            <a:r>
+              <a:rPr lang="en-GB" dirty="0" smtClean="0"/>
+              <a:t>Using different base for the dictionary (not screen hash value)</a:t>
+            </a:r>
+          </a:p>
+          <a:p>
+            <a:r>
+              <a:rPr lang="en-GB" dirty="0" smtClean="0"/>
+              <a:t>Make a different prime goal. Not eating the food but instead survive. </a:t>
+            </a:r>
+            <a:endParaRPr lang="en-GB" dirty="0"/>
+          </a:p>
+        </p:txBody>
+      </p:sp>
+    </p:spTree>
   </p:cSld>
   <p:clrMapOvr>
     <a:masterClrMapping/>
@@ -7416,7 +7597,7 @@
     </a:clrScheme>
     <a:fontScheme name="Office">
       <a:majorFont>
-        <a:latin typeface="Calibri Light" panose="020F0302020204030204"/>
+        <a:latin typeface="Calibri Light"/>
         <a:ea typeface=""/>
         <a:cs typeface=""/>
         <a:font script="Jpan" typeface="游ゴシック Light"/>
@@ -7451,7 +7632,7 @@
         <a:font script="Geor" typeface="Sylfaen"/>
       </a:majorFont>
       <a:minorFont>
-        <a:latin typeface="Calibri" panose="020F0502020204030204"/>
+        <a:latin typeface="Calibri"/>
         <a:ea typeface=""/>
         <a:cs typeface=""/>
         <a:font script="Jpan" typeface="游ゴシック"/>
@@ -7628,7 +7809,7 @@
   <a:extraClrSchemeLst/>
   <a:extLst>
     <a:ext uri="{05A4C25C-085E-4340-85A3-A5531E510DB2}">
-      <thm15:themeFamily xmlns:thm15="http://schemas.microsoft.com/office/thememl/2012/main" name="Office Theme" id="{62F939B6-93AF-4DB8-9C6B-D6C7DFDC589F}" vid="{4A3C46E8-61CC-4603-A589-7422A47A8E4A}"/>
+      <thm15:themeFamily xmlns:thm15="http://schemas.microsoft.com/office/thememl/2012/main" xmlns="" name="Office Theme" id="{62F939B6-93AF-4DB8-9C6B-D6C7DFDC589F}" vid="{4A3C46E8-61CC-4603-A589-7422A47A8E4A}"/>
     </a:ext>
   </a:extLst>
 </a:theme>

</xml_diff>

<commit_message>
Die meisten Aenderungen sind bei Abgabe03 neu.py
-wantDebug Variable zum besseren Nachvollziehen des Codes.
-keine hash funktion mehr
-das Essen wird in der Q Tabelle ignoriert
</commit_message>
<xml_diff>
--- a/Abgabe_04/Snake.pptx
+++ b/Abgabe_04/Snake.pptx
@@ -114,7 +114,7 @@
   </p:defaultTextStyle>
   <p:extLst>
     <p:ext uri="{EFAFB233-063F-42B5-8137-9DF3F51BA10A}">
-      <p15:sldGuideLst xmlns:p15="http://schemas.microsoft.com/office/powerpoint/2012/main" xmlns=""/>
+      <p15:sldGuideLst xmlns="" xmlns:p15="http://schemas.microsoft.com/office/powerpoint/2012/main"/>
     </p:ext>
   </p:extLst>
 </p:presentation>
@@ -308,7 +308,7 @@
     </p:spTree>
     <p:extLst>
       <p:ext uri="{BB962C8B-B14F-4D97-AF65-F5344CB8AC3E}">
-        <p14:creationId xmlns:p14="http://schemas.microsoft.com/office/powerpoint/2010/main" xmlns="" val="3906747047"/>
+        <p14:creationId xmlns="" xmlns:p14="http://schemas.microsoft.com/office/powerpoint/2010/main" val="3906747047"/>
       </p:ext>
     </p:extLst>
   </p:cSld>
@@ -480,7 +480,7 @@
     </p:spTree>
     <p:extLst>
       <p:ext uri="{BB962C8B-B14F-4D97-AF65-F5344CB8AC3E}">
-        <p14:creationId xmlns:p14="http://schemas.microsoft.com/office/powerpoint/2010/main" xmlns="" val="2892673225"/>
+        <p14:creationId xmlns="" xmlns:p14="http://schemas.microsoft.com/office/powerpoint/2010/main" val="2892673225"/>
       </p:ext>
     </p:extLst>
   </p:cSld>
@@ -662,7 +662,7 @@
     </p:spTree>
     <p:extLst>
       <p:ext uri="{BB962C8B-B14F-4D97-AF65-F5344CB8AC3E}">
-        <p14:creationId xmlns:p14="http://schemas.microsoft.com/office/powerpoint/2010/main" xmlns="" val="2060587485"/>
+        <p14:creationId xmlns="" xmlns:p14="http://schemas.microsoft.com/office/powerpoint/2010/main" val="2060587485"/>
       </p:ext>
     </p:extLst>
   </p:cSld>
@@ -834,7 +834,7 @@
     </p:spTree>
     <p:extLst>
       <p:ext uri="{BB962C8B-B14F-4D97-AF65-F5344CB8AC3E}">
-        <p14:creationId xmlns:p14="http://schemas.microsoft.com/office/powerpoint/2010/main" xmlns="" val="1183758719"/>
+        <p14:creationId xmlns="" xmlns:p14="http://schemas.microsoft.com/office/powerpoint/2010/main" val="1183758719"/>
       </p:ext>
     </p:extLst>
   </p:cSld>
@@ -1080,7 +1080,7 @@
     </p:spTree>
     <p:extLst>
       <p:ext uri="{BB962C8B-B14F-4D97-AF65-F5344CB8AC3E}">
-        <p14:creationId xmlns:p14="http://schemas.microsoft.com/office/powerpoint/2010/main" xmlns="" val="1222447334"/>
+        <p14:creationId xmlns="" xmlns:p14="http://schemas.microsoft.com/office/powerpoint/2010/main" val="1222447334"/>
       </p:ext>
     </p:extLst>
   </p:cSld>
@@ -1314,7 +1314,7 @@
     </p:spTree>
     <p:extLst>
       <p:ext uri="{BB962C8B-B14F-4D97-AF65-F5344CB8AC3E}">
-        <p14:creationId xmlns:p14="http://schemas.microsoft.com/office/powerpoint/2010/main" xmlns="" val="2892910547"/>
+        <p14:creationId xmlns="" xmlns:p14="http://schemas.microsoft.com/office/powerpoint/2010/main" val="2892910547"/>
       </p:ext>
     </p:extLst>
   </p:cSld>
@@ -1683,7 +1683,7 @@
     </p:spTree>
     <p:extLst>
       <p:ext uri="{BB962C8B-B14F-4D97-AF65-F5344CB8AC3E}">
-        <p14:creationId xmlns:p14="http://schemas.microsoft.com/office/powerpoint/2010/main" xmlns="" val="336821960"/>
+        <p14:creationId xmlns="" xmlns:p14="http://schemas.microsoft.com/office/powerpoint/2010/main" val="336821960"/>
       </p:ext>
     </p:extLst>
   </p:cSld>
@@ -1803,7 +1803,7 @@
     </p:spTree>
     <p:extLst>
       <p:ext uri="{BB962C8B-B14F-4D97-AF65-F5344CB8AC3E}">
-        <p14:creationId xmlns:p14="http://schemas.microsoft.com/office/powerpoint/2010/main" xmlns="" val="2086666829"/>
+        <p14:creationId xmlns="" xmlns:p14="http://schemas.microsoft.com/office/powerpoint/2010/main" val="2086666829"/>
       </p:ext>
     </p:extLst>
   </p:cSld>
@@ -1900,7 +1900,7 @@
     </p:spTree>
     <p:extLst>
       <p:ext uri="{BB962C8B-B14F-4D97-AF65-F5344CB8AC3E}">
-        <p14:creationId xmlns:p14="http://schemas.microsoft.com/office/powerpoint/2010/main" xmlns="" val="3906239143"/>
+        <p14:creationId xmlns="" xmlns:p14="http://schemas.microsoft.com/office/powerpoint/2010/main" val="3906239143"/>
       </p:ext>
     </p:extLst>
   </p:cSld>
@@ -2179,7 +2179,7 @@
     </p:spTree>
     <p:extLst>
       <p:ext uri="{BB962C8B-B14F-4D97-AF65-F5344CB8AC3E}">
-        <p14:creationId xmlns:p14="http://schemas.microsoft.com/office/powerpoint/2010/main" xmlns="" val="547768235"/>
+        <p14:creationId xmlns="" xmlns:p14="http://schemas.microsoft.com/office/powerpoint/2010/main" val="547768235"/>
       </p:ext>
     </p:extLst>
   </p:cSld>
@@ -2438,7 +2438,7 @@
     </p:spTree>
     <p:extLst>
       <p:ext uri="{BB962C8B-B14F-4D97-AF65-F5344CB8AC3E}">
-        <p14:creationId xmlns:p14="http://schemas.microsoft.com/office/powerpoint/2010/main" xmlns="" val="1863037652"/>
+        <p14:creationId xmlns="" xmlns:p14="http://schemas.microsoft.com/office/powerpoint/2010/main" val="1863037652"/>
       </p:ext>
     </p:extLst>
   </p:cSld>
@@ -2689,7 +2689,7 @@
     </p:spTree>
     <p:extLst>
       <p:ext uri="{BB962C8B-B14F-4D97-AF65-F5344CB8AC3E}">
-        <p14:creationId xmlns:p14="http://schemas.microsoft.com/office/powerpoint/2010/main" xmlns="" val="618788052"/>
+        <p14:creationId xmlns="" xmlns:p14="http://schemas.microsoft.com/office/powerpoint/2010/main" val="618788052"/>
       </p:ext>
     </p:extLst>
   </p:cSld>
@@ -3016,7 +3016,7 @@
           <p:nvPr>
             <p:extLst>
               <p:ext uri="{386F3935-93C4-4BCD-93E2-E3B085C9AB24}">
-                <p16:designElem xmlns:p16="http://schemas.microsoft.com/office/powerpoint/2015/main" xmlns="" val="1"/>
+                <p16:designElem xmlns="" xmlns:p16="http://schemas.microsoft.com/office/powerpoint/2015/main" val="1"/>
               </p:ext>
             </p:extLst>
           </p:nvPr>
@@ -3043,7 +3043,7 @@
           <p:cNvPr id="23" name="Freeform 5">
             <a:extLst>
               <a:ext uri="{FF2B5EF4-FFF2-40B4-BE49-F238E27FC236}">
-                <a16:creationId xmlns:a16="http://schemas.microsoft.com/office/drawing/2014/main" xmlns="" id="{00372701-83B9-478A-9B29-7A50C8310B9A}"/>
+                <a16:creationId xmlns="" xmlns:a16="http://schemas.microsoft.com/office/drawing/2014/main" id="{00372701-83B9-478A-9B29-7A50C8310B9A}"/>
               </a:ext>
             </a:extLst>
           </p:cNvPr>
@@ -3053,7 +3053,7 @@
           <p:nvPr>
             <p:extLst>
               <p:ext uri="{386F3935-93C4-4BCD-93E2-E3B085C9AB24}">
-                <p16:designElem xmlns:p16="http://schemas.microsoft.com/office/powerpoint/2015/main" xmlns="" val="1"/>
+                <p16:designElem xmlns="" xmlns:p16="http://schemas.microsoft.com/office/powerpoint/2015/main" val="1"/>
               </p:ext>
             </p:extLst>
           </p:nvPr>
@@ -3164,7 +3164,7 @@
           <p:cNvPr id="25" name="Freeform 6">
             <a:extLst>
               <a:ext uri="{FF2B5EF4-FFF2-40B4-BE49-F238E27FC236}">
-                <a16:creationId xmlns:a16="http://schemas.microsoft.com/office/drawing/2014/main" xmlns="" id="{9EDA5044-3268-4753-AEE8-20199924E26D}"/>
+                <a16:creationId xmlns="" xmlns:a16="http://schemas.microsoft.com/office/drawing/2014/main" id="{9EDA5044-3268-4753-AEE8-20199924E26D}"/>
               </a:ext>
             </a:extLst>
           </p:cNvPr>
@@ -3174,7 +3174,7 @@
           <p:nvPr>
             <p:extLst>
               <p:ext uri="{386F3935-93C4-4BCD-93E2-E3B085C9AB24}">
-                <p16:designElem xmlns:p16="http://schemas.microsoft.com/office/powerpoint/2015/main" xmlns="" val="1"/>
+                <p16:designElem xmlns="" xmlns:p16="http://schemas.microsoft.com/office/powerpoint/2015/main" val="1"/>
               </p:ext>
             </p:extLst>
           </p:nvPr>
@@ -3269,7 +3269,7 @@
           <p:cNvPr id="27" name="Freeform 7">
             <a:extLst>
               <a:ext uri="{FF2B5EF4-FFF2-40B4-BE49-F238E27FC236}">
-                <a16:creationId xmlns:a16="http://schemas.microsoft.com/office/drawing/2014/main" xmlns="" id="{111A83C6-3159-48A2-95E0-D9A872D3EF41}"/>
+                <a16:creationId xmlns="" xmlns:a16="http://schemas.microsoft.com/office/drawing/2014/main" id="{111A83C6-3159-48A2-95E0-D9A872D3EF41}"/>
               </a:ext>
             </a:extLst>
           </p:cNvPr>
@@ -3279,7 +3279,7 @@
           <p:nvPr>
             <p:extLst>
               <p:ext uri="{386F3935-93C4-4BCD-93E2-E3B085C9AB24}">
-                <p16:designElem xmlns:p16="http://schemas.microsoft.com/office/powerpoint/2015/main" xmlns="" val="1"/>
+                <p16:designElem xmlns="" xmlns:p16="http://schemas.microsoft.com/office/powerpoint/2015/main" val="1"/>
               </p:ext>
             </p:extLst>
           </p:nvPr>
@@ -3404,7 +3404,7 @@
           <p:cNvPr id="5" name="Grafik 4">
             <a:extLst>
               <a:ext uri="{FF2B5EF4-FFF2-40B4-BE49-F238E27FC236}">
-                <a16:creationId xmlns:a16="http://schemas.microsoft.com/office/drawing/2014/main" xmlns="" id="{8CAA02B2-9FA3-4AA9-B6B7-696C7175F2B2}"/>
+                <a16:creationId xmlns="" xmlns:a16="http://schemas.microsoft.com/office/drawing/2014/main" id="{8CAA02B2-9FA3-4AA9-B6B7-696C7175F2B2}"/>
               </a:ext>
             </a:extLst>
           </p:cNvPr>
@@ -3417,7 +3417,7 @@
           <a:blip r:embed="rId2" cstate="print">
             <a:extLst>
               <a:ext uri="{28A0092B-C50C-407E-A947-70E740481C1C}">
-                <a14:useLocalDpi xmlns:a14="http://schemas.microsoft.com/office/drawing/2010/main" xmlns="" val="0"/>
+                <a14:useLocalDpi xmlns="" xmlns:a14="http://schemas.microsoft.com/office/drawing/2010/main" val="0"/>
               </a:ext>
             </a:extLst>
           </a:blip>
@@ -3440,7 +3440,7 @@
           <p:cNvPr id="2" name="Titel 1">
             <a:extLst>
               <a:ext uri="{FF2B5EF4-FFF2-40B4-BE49-F238E27FC236}">
-                <a16:creationId xmlns:a16="http://schemas.microsoft.com/office/drawing/2014/main" xmlns="" id="{F484295F-0A4C-43CE-AB48-8BE9CAAF56E1}"/>
+                <a16:creationId xmlns="" xmlns:a16="http://schemas.microsoft.com/office/drawing/2014/main" id="{F484295F-0A4C-43CE-AB48-8BE9CAAF56E1}"/>
               </a:ext>
             </a:extLst>
           </p:cNvPr>
@@ -3481,7 +3481,7 @@
     </p:spTree>
     <p:extLst>
       <p:ext uri="{BB962C8B-B14F-4D97-AF65-F5344CB8AC3E}">
-        <p14:creationId xmlns:p14="http://schemas.microsoft.com/office/powerpoint/2010/main" xmlns="" val="3513230421"/>
+        <p14:creationId xmlns="" xmlns:p14="http://schemas.microsoft.com/office/powerpoint/2010/main" val="3513230421"/>
       </p:ext>
     </p:extLst>
   </p:cSld>
@@ -3513,7 +3513,7 @@
           <p:cNvPr id="2" name="Titel 1">
             <a:extLst>
               <a:ext uri="{FF2B5EF4-FFF2-40B4-BE49-F238E27FC236}">
-                <a16:creationId xmlns:a16="http://schemas.microsoft.com/office/drawing/2014/main" xmlns="" id="{F3C4A856-293E-4803-878E-F2C8DE582587}"/>
+                <a16:creationId xmlns="" xmlns:a16="http://schemas.microsoft.com/office/drawing/2014/main" id="{F3C4A856-293E-4803-878E-F2C8DE582587}"/>
               </a:ext>
             </a:extLst>
           </p:cNvPr>
@@ -3546,7 +3546,7 @@
           <p:cNvPr id="3" name="Inhaltsplatzhalter 2">
             <a:extLst>
               <a:ext uri="{FF2B5EF4-FFF2-40B4-BE49-F238E27FC236}">
-                <a16:creationId xmlns:a16="http://schemas.microsoft.com/office/drawing/2014/main" xmlns="" id="{680F217C-E4CE-4057-8D1A-D7BC4E6D818E}"/>
+                <a16:creationId xmlns="" xmlns:a16="http://schemas.microsoft.com/office/drawing/2014/main" id="{680F217C-E4CE-4057-8D1A-D7BC4E6D818E}"/>
               </a:ext>
             </a:extLst>
           </p:cNvPr>
@@ -3600,7 +3600,7 @@
           <p:cNvPr id="4" name="Rectangle 1">
             <a:extLst>
               <a:ext uri="{FF2B5EF4-FFF2-40B4-BE49-F238E27FC236}">
-                <a16:creationId xmlns:a16="http://schemas.microsoft.com/office/drawing/2014/main" xmlns="" id="{4FD2C3FD-55A5-49CF-A71B-E919D496E404}"/>
+                <a16:creationId xmlns="" xmlns:a16="http://schemas.microsoft.com/office/drawing/2014/main" id="{4FD2C3FD-55A5-49CF-A71B-E919D496E404}"/>
               </a:ext>
             </a:extLst>
           </p:cNvPr>
@@ -3626,7 +3626,7 @@
           <a:effectLst/>
           <a:extLst>
             <a:ext uri="{91240B29-F687-4F45-9708-019B960494DF}">
-              <a14:hiddenLine xmlns:a14="http://schemas.microsoft.com/office/drawing/2010/main" xmlns="" w="9525">
+              <a14:hiddenLine xmlns="" xmlns:a14="http://schemas.microsoft.com/office/drawing/2010/main" w="9525">
                 <a:solidFill>
                   <a:schemeClr val="tx1"/>
                 </a:solidFill>
@@ -3636,7 +3636,7 @@
               </a14:hiddenLine>
             </a:ext>
             <a:ext uri="{AF507438-7753-43E0-B8FC-AC1667EBCBE1}">
-              <a14:hiddenEffects xmlns:a14="http://schemas.microsoft.com/office/drawing/2010/main" xmlns="">
+              <a14:hiddenEffects xmlns="" xmlns:a14="http://schemas.microsoft.com/office/drawing/2010/main">
                 <a:effectLst>
                   <a:outerShdw dist="35921" dir="2700000" algn="ctr" rotWithShape="0">
                     <a:schemeClr val="bg2"/>
@@ -5968,7 +5968,7 @@
     </p:spTree>
     <p:extLst>
       <p:ext uri="{BB962C8B-B14F-4D97-AF65-F5344CB8AC3E}">
-        <p14:creationId xmlns:p14="http://schemas.microsoft.com/office/powerpoint/2010/main" xmlns="" val="1616801963"/>
+        <p14:creationId xmlns="" xmlns:p14="http://schemas.microsoft.com/office/powerpoint/2010/main" val="1616801963"/>
       </p:ext>
     </p:extLst>
   </p:cSld>
@@ -6000,7 +6000,7 @@
           <p:cNvPr id="2" name="Titel 1">
             <a:extLst>
               <a:ext uri="{FF2B5EF4-FFF2-40B4-BE49-F238E27FC236}">
-                <a16:creationId xmlns:a16="http://schemas.microsoft.com/office/drawing/2014/main" xmlns="" id="{F3C4A856-293E-4803-878E-F2C8DE582587}"/>
+                <a16:creationId xmlns="" xmlns:a16="http://schemas.microsoft.com/office/drawing/2014/main" id="{F3C4A856-293E-4803-878E-F2C8DE582587}"/>
               </a:ext>
             </a:extLst>
           </p:cNvPr>
@@ -6022,14 +6022,10 @@
           <a:lstStyle/>
           <a:p>
             <a:r>
-              <a:rPr lang="de-DE" dirty="0"/>
-              <a:t>Different </a:t>
-            </a:r>
-            <a:r>
-              <a:rPr lang="de-DE" dirty="0" err="1"/>
-              <a:t>configurations</a:t>
-            </a:r>
-            <a:endParaRPr lang="de-DE" dirty="0"/>
+              <a:rPr lang="en-GB" dirty="0" smtClean="0"/>
+              <a:t>Different configurations</a:t>
+            </a:r>
+            <a:endParaRPr lang="en-GB" dirty="0"/>
           </a:p>
         </p:txBody>
       </p:sp>
@@ -6038,7 +6034,7 @@
           <p:cNvPr id="7" name="Grafik 6" descr="Ein Bild, das Screenshot enthält.&#10;&#10;Mit sehr hoher Zuverlässigkeit generierte Beschreibung">
             <a:extLst>
               <a:ext uri="{FF2B5EF4-FFF2-40B4-BE49-F238E27FC236}">
-                <a16:creationId xmlns:a16="http://schemas.microsoft.com/office/drawing/2014/main" xmlns="" id="{DA614065-02B3-4462-AAF4-17DD34F7BC18}"/>
+                <a16:creationId xmlns="" xmlns:a16="http://schemas.microsoft.com/office/drawing/2014/main" id="{DA614065-02B3-4462-AAF4-17DD34F7BC18}"/>
               </a:ext>
             </a:extLst>
           </p:cNvPr>
@@ -6051,7 +6047,7 @@
           <a:blip r:embed="rId2" cstate="print">
             <a:extLst>
               <a:ext uri="{28A0092B-C50C-407E-A947-70E740481C1C}">
-                <a14:useLocalDpi xmlns:a14="http://schemas.microsoft.com/office/drawing/2010/main" xmlns="" val="0"/>
+                <a14:useLocalDpi xmlns="" xmlns:a14="http://schemas.microsoft.com/office/drawing/2010/main" val="0"/>
               </a:ext>
             </a:extLst>
           </a:blip>
@@ -6074,7 +6070,7 @@
           <p:cNvPr id="9" name="Grafik 8" descr="Ein Bild, das Screenshot enthält.&#10;&#10;Mit sehr hoher Zuverlässigkeit generierte Beschreibung">
             <a:extLst>
               <a:ext uri="{FF2B5EF4-FFF2-40B4-BE49-F238E27FC236}">
-                <a16:creationId xmlns:a16="http://schemas.microsoft.com/office/drawing/2014/main" xmlns="" id="{2BF2EBE6-EBF9-458B-882D-67E30AEED9E3}"/>
+                <a16:creationId xmlns="" xmlns:a16="http://schemas.microsoft.com/office/drawing/2014/main" id="{2BF2EBE6-EBF9-458B-882D-67E30AEED9E3}"/>
               </a:ext>
             </a:extLst>
           </p:cNvPr>
@@ -6087,7 +6083,7 @@
           <a:blip r:embed="rId3" cstate="print">
             <a:extLst>
               <a:ext uri="{28A0092B-C50C-407E-A947-70E740481C1C}">
-                <a14:useLocalDpi xmlns:a14="http://schemas.microsoft.com/office/drawing/2010/main" xmlns="" val="0"/>
+                <a14:useLocalDpi xmlns="" xmlns:a14="http://schemas.microsoft.com/office/drawing/2010/main" val="0"/>
               </a:ext>
             </a:extLst>
           </a:blip>
@@ -6110,7 +6106,7 @@
           <p:cNvPr id="15" name="Grafik 14" descr="Ein Bild, das Screenshot enthält.&#10;&#10;Mit sehr hoher Zuverlässigkeit generierte Beschreibung">
             <a:extLst>
               <a:ext uri="{FF2B5EF4-FFF2-40B4-BE49-F238E27FC236}">
-                <a16:creationId xmlns:a16="http://schemas.microsoft.com/office/drawing/2014/main" xmlns="" id="{34B82BAF-3EBC-44B4-AAED-084C6A39358F}"/>
+                <a16:creationId xmlns="" xmlns:a16="http://schemas.microsoft.com/office/drawing/2014/main" id="{34B82BAF-3EBC-44B4-AAED-084C6A39358F}"/>
               </a:ext>
             </a:extLst>
           </p:cNvPr>
@@ -6123,7 +6119,7 @@
           <a:blip r:embed="rId4" cstate="print">
             <a:extLst>
               <a:ext uri="{28A0092B-C50C-407E-A947-70E740481C1C}">
-                <a14:useLocalDpi xmlns:a14="http://schemas.microsoft.com/office/drawing/2010/main" xmlns="" val="0"/>
+                <a14:useLocalDpi xmlns="" xmlns:a14="http://schemas.microsoft.com/office/drawing/2010/main" val="0"/>
               </a:ext>
             </a:extLst>
           </a:blip>
@@ -6146,7 +6142,7 @@
           <p:cNvPr id="17" name="Grafik 16" descr="Ein Bild, das Screenshot enthält.&#10;&#10;Mit hoher Zuverlässigkeit generierte Beschreibung">
             <a:extLst>
               <a:ext uri="{FF2B5EF4-FFF2-40B4-BE49-F238E27FC236}">
-                <a16:creationId xmlns:a16="http://schemas.microsoft.com/office/drawing/2014/main" xmlns="" id="{D72731C5-16C6-4AD2-889F-17367D63BF66}"/>
+                <a16:creationId xmlns="" xmlns:a16="http://schemas.microsoft.com/office/drawing/2014/main" id="{D72731C5-16C6-4AD2-889F-17367D63BF66}"/>
               </a:ext>
             </a:extLst>
           </p:cNvPr>
@@ -6159,7 +6155,7 @@
           <a:blip r:embed="rId5" cstate="print">
             <a:extLst>
               <a:ext uri="{28A0092B-C50C-407E-A947-70E740481C1C}">
-                <a14:useLocalDpi xmlns:a14="http://schemas.microsoft.com/office/drawing/2010/main" xmlns="" val="0"/>
+                <a14:useLocalDpi xmlns="" xmlns:a14="http://schemas.microsoft.com/office/drawing/2010/main" val="0"/>
               </a:ext>
             </a:extLst>
           </a:blip>
@@ -6180,7 +6176,7 @@
     </p:spTree>
     <p:extLst>
       <p:ext uri="{BB962C8B-B14F-4D97-AF65-F5344CB8AC3E}">
-        <p14:creationId xmlns:p14="http://schemas.microsoft.com/office/powerpoint/2010/main" xmlns="" val="2454394433"/>
+        <p14:creationId xmlns="" xmlns:p14="http://schemas.microsoft.com/office/powerpoint/2010/main" val="2454394433"/>
       </p:ext>
     </p:extLst>
   </p:cSld>
@@ -6212,7 +6208,7 @@
           <p:cNvPr id="2" name="Titel 1">
             <a:extLst>
               <a:ext uri="{FF2B5EF4-FFF2-40B4-BE49-F238E27FC236}">
-                <a16:creationId xmlns:a16="http://schemas.microsoft.com/office/drawing/2014/main" xmlns="" id="{F3C4A856-293E-4803-878E-F2C8DE582587}"/>
+                <a16:creationId xmlns="" xmlns:a16="http://schemas.microsoft.com/office/drawing/2014/main" id="{F3C4A856-293E-4803-878E-F2C8DE582587}"/>
               </a:ext>
             </a:extLst>
           </p:cNvPr>
@@ -6250,7 +6246,7 @@
           <p:cNvPr id="11" name="Grafik 10" descr="Ein Bild, das Screenshot enthält.&#10;&#10;Mit sehr hoher Zuverlässigkeit generierte Beschreibung">
             <a:extLst>
               <a:ext uri="{FF2B5EF4-FFF2-40B4-BE49-F238E27FC236}">
-                <a16:creationId xmlns:a16="http://schemas.microsoft.com/office/drawing/2014/main" xmlns="" id="{B459BF4D-D464-4073-8BEB-90A830C0535D}"/>
+                <a16:creationId xmlns="" xmlns:a16="http://schemas.microsoft.com/office/drawing/2014/main" id="{B459BF4D-D464-4073-8BEB-90A830C0535D}"/>
               </a:ext>
             </a:extLst>
           </p:cNvPr>
@@ -6263,7 +6259,7 @@
           <a:blip r:embed="rId2" cstate="print">
             <a:extLst>
               <a:ext uri="{28A0092B-C50C-407E-A947-70E740481C1C}">
-                <a14:useLocalDpi xmlns:a14="http://schemas.microsoft.com/office/drawing/2010/main" xmlns="" val="0"/>
+                <a14:useLocalDpi xmlns="" xmlns:a14="http://schemas.microsoft.com/office/drawing/2010/main" val="0"/>
               </a:ext>
             </a:extLst>
           </a:blip>
@@ -6286,7 +6282,7 @@
           <p:cNvPr id="13" name="Grafik 12" descr="Ein Bild, das Screenshot enthält.&#10;&#10;Mit sehr hoher Zuverlässigkeit generierte Beschreibung">
             <a:extLst>
               <a:ext uri="{FF2B5EF4-FFF2-40B4-BE49-F238E27FC236}">
-                <a16:creationId xmlns:a16="http://schemas.microsoft.com/office/drawing/2014/main" xmlns="" id="{95574CB2-CACE-4B80-9599-BCAB69C59C00}"/>
+                <a16:creationId xmlns="" xmlns:a16="http://schemas.microsoft.com/office/drawing/2014/main" id="{95574CB2-CACE-4B80-9599-BCAB69C59C00}"/>
               </a:ext>
             </a:extLst>
           </p:cNvPr>
@@ -6299,7 +6295,7 @@
           <a:blip r:embed="rId3" cstate="print">
             <a:extLst>
               <a:ext uri="{28A0092B-C50C-407E-A947-70E740481C1C}">
-                <a14:useLocalDpi xmlns:a14="http://schemas.microsoft.com/office/drawing/2010/main" xmlns="" val="0"/>
+                <a14:useLocalDpi xmlns="" xmlns:a14="http://schemas.microsoft.com/office/drawing/2010/main" val="0"/>
               </a:ext>
             </a:extLst>
           </a:blip>
@@ -6322,7 +6318,7 @@
           <p:cNvPr id="17" name="Grafik 16" descr="Ein Bild, das Screenshot enthält.&#10;&#10;Mit hoher Zuverlässigkeit generierte Beschreibung">
             <a:extLst>
               <a:ext uri="{FF2B5EF4-FFF2-40B4-BE49-F238E27FC236}">
-                <a16:creationId xmlns:a16="http://schemas.microsoft.com/office/drawing/2014/main" xmlns="" id="{D72731C5-16C6-4AD2-889F-17367D63BF66}"/>
+                <a16:creationId xmlns="" xmlns:a16="http://schemas.microsoft.com/office/drawing/2014/main" id="{D72731C5-16C6-4AD2-889F-17367D63BF66}"/>
               </a:ext>
             </a:extLst>
           </p:cNvPr>
@@ -6335,7 +6331,7 @@
           <a:blip r:embed="rId4" cstate="print">
             <a:extLst>
               <a:ext uri="{28A0092B-C50C-407E-A947-70E740481C1C}">
-                <a14:useLocalDpi xmlns:a14="http://schemas.microsoft.com/office/drawing/2010/main" xmlns="" val="0"/>
+                <a14:useLocalDpi xmlns="" xmlns:a14="http://schemas.microsoft.com/office/drawing/2010/main" val="0"/>
               </a:ext>
             </a:extLst>
           </a:blip>
@@ -6358,7 +6354,7 @@
           <p:cNvPr id="10" name="Titel 1">
             <a:extLst>
               <a:ext uri="{FF2B5EF4-FFF2-40B4-BE49-F238E27FC236}">
-                <a16:creationId xmlns:a16="http://schemas.microsoft.com/office/drawing/2014/main" xmlns="" id="{F9F43983-8000-46E0-917B-5E790B5F8CCA}"/>
+                <a16:creationId xmlns="" xmlns:a16="http://schemas.microsoft.com/office/drawing/2014/main" id="{F9F43983-8000-46E0-917B-5E790B5F8CCA}"/>
               </a:ext>
             </a:extLst>
           </p:cNvPr>
@@ -6491,7 +6487,7 @@
     </p:spTree>
     <p:extLst>
       <p:ext uri="{BB962C8B-B14F-4D97-AF65-F5344CB8AC3E}">
-        <p14:creationId xmlns:p14="http://schemas.microsoft.com/office/powerpoint/2010/main" xmlns="" val="4090947474"/>
+        <p14:creationId xmlns="" xmlns:p14="http://schemas.microsoft.com/office/powerpoint/2010/main" val="4090947474"/>
       </p:ext>
     </p:extLst>
   </p:cSld>
@@ -6523,7 +6519,7 @@
           <p:cNvPr id="2" name="Titel 1">
             <a:extLst>
               <a:ext uri="{FF2B5EF4-FFF2-40B4-BE49-F238E27FC236}">
-                <a16:creationId xmlns:a16="http://schemas.microsoft.com/office/drawing/2014/main" xmlns="" id="{790F9AC3-0C0B-44A8-BABD-11158595DB04}"/>
+                <a16:creationId xmlns="" xmlns:a16="http://schemas.microsoft.com/office/drawing/2014/main" id="{790F9AC3-0C0B-44A8-BABD-11158595DB04}"/>
               </a:ext>
             </a:extLst>
           </p:cNvPr>
@@ -6551,7 +6547,7 @@
           <p:cNvPr id="5" name="Titel 1">
             <a:extLst>
               <a:ext uri="{FF2B5EF4-FFF2-40B4-BE49-F238E27FC236}">
-                <a16:creationId xmlns:a16="http://schemas.microsoft.com/office/drawing/2014/main" xmlns="" id="{68F06C64-4236-48EC-9335-9933BD05103B}"/>
+                <a16:creationId xmlns="" xmlns:a16="http://schemas.microsoft.com/office/drawing/2014/main" id="{68F06C64-4236-48EC-9335-9933BD05103B}"/>
               </a:ext>
             </a:extLst>
           </p:cNvPr>
@@ -6804,7 +6800,7 @@
     </p:spTree>
     <p:extLst>
       <p:ext uri="{BB962C8B-B14F-4D97-AF65-F5344CB8AC3E}">
-        <p14:creationId xmlns:p14="http://schemas.microsoft.com/office/powerpoint/2010/main" xmlns="" val="730482725"/>
+        <p14:creationId xmlns="" xmlns:p14="http://schemas.microsoft.com/office/powerpoint/2010/main" val="730482725"/>
       </p:ext>
     </p:extLst>
   </p:cSld>
@@ -6836,7 +6832,7 @@
           <p:cNvPr id="2" name="Titel 1">
             <a:extLst>
               <a:ext uri="{FF2B5EF4-FFF2-40B4-BE49-F238E27FC236}">
-                <a16:creationId xmlns:a16="http://schemas.microsoft.com/office/drawing/2014/main" xmlns="" id="{AE3234C3-EE4D-4822-8FF7-55BABE181E85}"/>
+                <a16:creationId xmlns="" xmlns:a16="http://schemas.microsoft.com/office/drawing/2014/main" id="{AE3234C3-EE4D-4822-8FF7-55BABE181E85}"/>
               </a:ext>
             </a:extLst>
           </p:cNvPr>
@@ -6870,7 +6866,7 @@
           <p:cNvPr id="4" name="Grafik 3" descr="Ein Bild, das Screenshot enthält.&#10;&#10;Mit sehr hoher Zuverlässigkeit generierte Beschreibung">
             <a:extLst>
               <a:ext uri="{FF2B5EF4-FFF2-40B4-BE49-F238E27FC236}">
-                <a16:creationId xmlns:a16="http://schemas.microsoft.com/office/drawing/2014/main" xmlns="" id="{404D9847-5971-4F91-AFE8-B4F10838B6AD}"/>
+                <a16:creationId xmlns="" xmlns:a16="http://schemas.microsoft.com/office/drawing/2014/main" id="{404D9847-5971-4F91-AFE8-B4F10838B6AD}"/>
               </a:ext>
             </a:extLst>
           </p:cNvPr>
@@ -6883,7 +6879,7 @@
           <a:blip r:embed="rId2" cstate="print">
             <a:extLst>
               <a:ext uri="{28A0092B-C50C-407E-A947-70E740481C1C}">
-                <a14:useLocalDpi xmlns:a14="http://schemas.microsoft.com/office/drawing/2010/main" xmlns="" val="0"/>
+                <a14:useLocalDpi xmlns="" xmlns:a14="http://schemas.microsoft.com/office/drawing/2010/main" val="0"/>
               </a:ext>
             </a:extLst>
           </a:blip>
@@ -6906,7 +6902,7 @@
           <p:cNvPr id="6" name="Grafik 5" descr="Ein Bild, das Screenshot enthält.&#10;&#10;Mit sehr hoher Zuverlässigkeit generierte Beschreibung">
             <a:extLst>
               <a:ext uri="{FF2B5EF4-FFF2-40B4-BE49-F238E27FC236}">
-                <a16:creationId xmlns:a16="http://schemas.microsoft.com/office/drawing/2014/main" xmlns="" id="{D9F400AE-E8D0-42A1-9E92-C3F29CD4F89A}"/>
+                <a16:creationId xmlns="" xmlns:a16="http://schemas.microsoft.com/office/drawing/2014/main" id="{D9F400AE-E8D0-42A1-9E92-C3F29CD4F89A}"/>
               </a:ext>
             </a:extLst>
           </p:cNvPr>
@@ -6919,7 +6915,7 @@
           <a:blip r:embed="rId3" cstate="print">
             <a:extLst>
               <a:ext uri="{28A0092B-C50C-407E-A947-70E740481C1C}">
-                <a14:useLocalDpi xmlns:a14="http://schemas.microsoft.com/office/drawing/2010/main" xmlns="" val="0"/>
+                <a14:useLocalDpi xmlns="" xmlns:a14="http://schemas.microsoft.com/office/drawing/2010/main" val="0"/>
               </a:ext>
             </a:extLst>
           </a:blip>
@@ -6942,7 +6938,7 @@
           <p:cNvPr id="8" name="Grafik 7" descr="Ein Bild, das Screenshot enthält.&#10;&#10;Mit sehr hoher Zuverlässigkeit generierte Beschreibung">
             <a:extLst>
               <a:ext uri="{FF2B5EF4-FFF2-40B4-BE49-F238E27FC236}">
-                <a16:creationId xmlns:a16="http://schemas.microsoft.com/office/drawing/2014/main" xmlns="" id="{B93D52A2-84BA-46FA-9D4B-E1FEADF08042}"/>
+                <a16:creationId xmlns="" xmlns:a16="http://schemas.microsoft.com/office/drawing/2014/main" id="{B93D52A2-84BA-46FA-9D4B-E1FEADF08042}"/>
               </a:ext>
             </a:extLst>
           </p:cNvPr>
@@ -6955,7 +6951,7 @@
           <a:blip r:embed="rId4" cstate="print">
             <a:extLst>
               <a:ext uri="{28A0092B-C50C-407E-A947-70E740481C1C}">
-                <a14:useLocalDpi xmlns:a14="http://schemas.microsoft.com/office/drawing/2010/main" xmlns="" val="0"/>
+                <a14:useLocalDpi xmlns="" xmlns:a14="http://schemas.microsoft.com/office/drawing/2010/main" val="0"/>
               </a:ext>
             </a:extLst>
           </a:blip>
@@ -6978,7 +6974,7 @@
           <p:cNvPr id="10" name="Grafik 9" descr="Ein Bild, das Screenshot enthält.&#10;&#10;Mit hoher Zuverlässigkeit generierte Beschreibung">
             <a:extLst>
               <a:ext uri="{FF2B5EF4-FFF2-40B4-BE49-F238E27FC236}">
-                <a16:creationId xmlns:a16="http://schemas.microsoft.com/office/drawing/2014/main" xmlns="" id="{77889346-267D-4CE1-A84E-CF6C081A2841}"/>
+                <a16:creationId xmlns="" xmlns:a16="http://schemas.microsoft.com/office/drawing/2014/main" id="{77889346-267D-4CE1-A84E-CF6C081A2841}"/>
               </a:ext>
             </a:extLst>
           </p:cNvPr>
@@ -6991,7 +6987,7 @@
           <a:blip r:embed="rId5" cstate="print">
             <a:extLst>
               <a:ext uri="{28A0092B-C50C-407E-A947-70E740481C1C}">
-                <a14:useLocalDpi xmlns:a14="http://schemas.microsoft.com/office/drawing/2010/main" xmlns="" val="0"/>
+                <a14:useLocalDpi xmlns="" xmlns:a14="http://schemas.microsoft.com/office/drawing/2010/main" val="0"/>
               </a:ext>
             </a:extLst>
           </a:blip>
@@ -7014,7 +7010,7 @@
           <p:cNvPr id="11" name="Titel 1">
             <a:extLst>
               <a:ext uri="{FF2B5EF4-FFF2-40B4-BE49-F238E27FC236}">
-                <a16:creationId xmlns:a16="http://schemas.microsoft.com/office/drawing/2014/main" xmlns="" id="{78A0882B-D18F-457A-94C6-1863D9074DD8}"/>
+                <a16:creationId xmlns="" xmlns:a16="http://schemas.microsoft.com/office/drawing/2014/main" id="{78A0882B-D18F-457A-94C6-1863D9074DD8}"/>
               </a:ext>
             </a:extLst>
           </p:cNvPr>
@@ -7067,7 +7063,7 @@
     </p:spTree>
     <p:extLst>
       <p:ext uri="{BB962C8B-B14F-4D97-AF65-F5344CB8AC3E}">
-        <p14:creationId xmlns:p14="http://schemas.microsoft.com/office/powerpoint/2010/main" xmlns="" val="3084186297"/>
+        <p14:creationId xmlns="" xmlns:p14="http://schemas.microsoft.com/office/powerpoint/2010/main" val="3084186297"/>
       </p:ext>
     </p:extLst>
   </p:cSld>
@@ -7099,7 +7095,7 @@
           <p:cNvPr id="2" name="Titel 1">
             <a:extLst>
               <a:ext uri="{FF2B5EF4-FFF2-40B4-BE49-F238E27FC236}">
-                <a16:creationId xmlns:a16="http://schemas.microsoft.com/office/drawing/2014/main" xmlns="" id="{AE3234C3-EE4D-4822-8FF7-55BABE181E85}"/>
+                <a16:creationId xmlns="" xmlns:a16="http://schemas.microsoft.com/office/drawing/2014/main" id="{AE3234C3-EE4D-4822-8FF7-55BABE181E85}"/>
               </a:ext>
             </a:extLst>
           </p:cNvPr>
@@ -7133,7 +7129,7 @@
           <p:cNvPr id="10" name="Grafik 9" descr="Ein Bild, das Screenshot enthält.&#10;&#10;Mit hoher Zuverlässigkeit generierte Beschreibung">
             <a:extLst>
               <a:ext uri="{FF2B5EF4-FFF2-40B4-BE49-F238E27FC236}">
-                <a16:creationId xmlns:a16="http://schemas.microsoft.com/office/drawing/2014/main" xmlns="" id="{77889346-267D-4CE1-A84E-CF6C081A2841}"/>
+                <a16:creationId xmlns="" xmlns:a16="http://schemas.microsoft.com/office/drawing/2014/main" id="{77889346-267D-4CE1-A84E-CF6C081A2841}"/>
               </a:ext>
             </a:extLst>
           </p:cNvPr>
@@ -7146,7 +7142,7 @@
           <a:blip r:embed="rId2" cstate="print">
             <a:extLst>
               <a:ext uri="{28A0092B-C50C-407E-A947-70E740481C1C}">
-                <a14:useLocalDpi xmlns:a14="http://schemas.microsoft.com/office/drawing/2010/main" xmlns="" val="0"/>
+                <a14:useLocalDpi xmlns="" xmlns:a14="http://schemas.microsoft.com/office/drawing/2010/main" val="0"/>
               </a:ext>
             </a:extLst>
           </a:blip>
@@ -7169,7 +7165,7 @@
           <p:cNvPr id="13" name="Grafik 12" descr="Ein Bild, das Screenshot enthält.&#10;&#10;Mit sehr hoher Zuverlässigkeit generierte Beschreibung">
             <a:extLst>
               <a:ext uri="{FF2B5EF4-FFF2-40B4-BE49-F238E27FC236}">
-                <a16:creationId xmlns:a16="http://schemas.microsoft.com/office/drawing/2014/main" xmlns="" id="{3A25BF2C-386F-4E5F-B9CC-06F89626B890}"/>
+                <a16:creationId xmlns="" xmlns:a16="http://schemas.microsoft.com/office/drawing/2014/main" id="{3A25BF2C-386F-4E5F-B9CC-06F89626B890}"/>
               </a:ext>
             </a:extLst>
           </p:cNvPr>
@@ -7182,7 +7178,7 @@
           <a:blip r:embed="rId3" cstate="print">
             <a:extLst>
               <a:ext uri="{28A0092B-C50C-407E-A947-70E740481C1C}">
-                <a14:useLocalDpi xmlns:a14="http://schemas.microsoft.com/office/drawing/2010/main" xmlns="" val="0"/>
+                <a14:useLocalDpi xmlns="" xmlns:a14="http://schemas.microsoft.com/office/drawing/2010/main" val="0"/>
               </a:ext>
             </a:extLst>
           </a:blip>
@@ -7203,7 +7199,7 @@
     </p:spTree>
     <p:extLst>
       <p:ext uri="{BB962C8B-B14F-4D97-AF65-F5344CB8AC3E}">
-        <p14:creationId xmlns:p14="http://schemas.microsoft.com/office/powerpoint/2010/main" xmlns="" val="3112286815"/>
+        <p14:creationId xmlns="" xmlns:p14="http://schemas.microsoft.com/office/powerpoint/2010/main" val="3112286815"/>
       </p:ext>
     </p:extLst>
   </p:cSld>
@@ -7235,7 +7231,7 @@
           <p:cNvPr id="2" name="Titel 1">
             <a:extLst>
               <a:ext uri="{FF2B5EF4-FFF2-40B4-BE49-F238E27FC236}">
-                <a16:creationId xmlns:a16="http://schemas.microsoft.com/office/drawing/2014/main" xmlns="" id="{AE3234C3-EE4D-4822-8FF7-55BABE181E85}"/>
+                <a16:creationId xmlns="" xmlns:a16="http://schemas.microsoft.com/office/drawing/2014/main" id="{AE3234C3-EE4D-4822-8FF7-55BABE181E85}"/>
               </a:ext>
             </a:extLst>
           </p:cNvPr>
@@ -7265,7 +7261,7 @@
         </p:txBody>
       </p:sp>
       <mc:AlternateContent xmlns:mc="http://schemas.openxmlformats.org/markup-compatibility/2006">
-        <mc:Choice xmlns:a14="http://schemas.microsoft.com/office/drawing/2010/main" xmlns="" Requires="a14">
+        <mc:Choice xmlns="" xmlns:a14="http://schemas.microsoft.com/office/drawing/2010/main" Requires="a14">
           <p:sp>
             <p:nvSpPr>
               <p:cNvPr id="5" name="Titel 1">
@@ -7413,7 +7409,7 @@
               <p:cNvPr id="5" name="Titel 1">
                 <a:extLst>
                   <a:ext uri="{FF2B5EF4-FFF2-40B4-BE49-F238E27FC236}">
-                    <a16:creationId xmlns:a16="http://schemas.microsoft.com/office/drawing/2014/main" xmlns="" id="{6E7B1F94-82A4-488C-B127-0C0E509EC791}"/>
+                    <a16:creationId xmlns="" xmlns:a16="http://schemas.microsoft.com/office/drawing/2014/main" id="{6E7B1F94-82A4-488C-B127-0C0E509EC791}"/>
                   </a:ext>
                 </a:extLst>
               </p:cNvPr>
@@ -7455,7 +7451,7 @@
     </p:spTree>
     <p:extLst>
       <p:ext uri="{BB962C8B-B14F-4D97-AF65-F5344CB8AC3E}">
-        <p14:creationId xmlns:p14="http://schemas.microsoft.com/office/powerpoint/2010/main" xmlns="" val="728113264"/>
+        <p14:creationId xmlns="" xmlns:p14="http://schemas.microsoft.com/office/powerpoint/2010/main" val="728113264"/>
       </p:ext>
     </p:extLst>
   </p:cSld>
@@ -7809,7 +7805,7 @@
   <a:extraClrSchemeLst/>
   <a:extLst>
     <a:ext uri="{05A4C25C-085E-4340-85A3-A5531E510DB2}">
-      <thm15:themeFamily xmlns:thm15="http://schemas.microsoft.com/office/thememl/2012/main" xmlns="" name="Office Theme" id="{62F939B6-93AF-4DB8-9C6B-D6C7DFDC589F}" vid="{4A3C46E8-61CC-4603-A589-7422A47A8E4A}"/>
+      <thm15:themeFamily xmlns="" xmlns:thm15="http://schemas.microsoft.com/office/thememl/2012/main" name="Office Theme" id="{62F939B6-93AF-4DB8-9C6B-D6C7DFDC589F}" vid="{4A3C46E8-61CC-4603-A589-7422A47A8E4A}"/>
     </a:ext>
   </a:extLst>
 </a:theme>

</xml_diff>